<commit_message>
update doc and code
</commit_message>
<xml_diff>
--- a/Document/Baocao.pptx
+++ b/Document/Baocao.pptx
@@ -1,19 +1,23 @@
 
 <file path=ppt/presentation.xml><?xml version="1.0" encoding="utf-8"?>
-<p:presentation xmlns:a="http://schemas.openxmlformats.org/drawingml/2006/main" xmlns:r="http://schemas.openxmlformats.org/officeDocument/2006/relationships" xmlns:p="http://schemas.openxmlformats.org/presentationml/2006/main" saveSubsetFonts="1">
+<p:presentation xmlns:a="http://schemas.openxmlformats.org/drawingml/2006/main" xmlns:r="http://schemas.openxmlformats.org/officeDocument/2006/relationships" xmlns:p="http://schemas.openxmlformats.org/presentationml/2006/main" saveSubsetFonts="1" bookmarkIdSeed="7">
   <p:sldMasterIdLst>
     <p:sldMasterId id="2147483707" r:id="rId1"/>
   </p:sldMasterIdLst>
   <p:sldIdLst>
     <p:sldId id="256" r:id="rId2"/>
     <p:sldId id="257" r:id="rId3"/>
-    <p:sldId id="258" r:id="rId4"/>
-    <p:sldId id="262" r:id="rId5"/>
-    <p:sldId id="259" r:id="rId6"/>
-    <p:sldId id="263" r:id="rId7"/>
-    <p:sldId id="260" r:id="rId8"/>
-    <p:sldId id="264" r:id="rId9"/>
-    <p:sldId id="261" r:id="rId10"/>
+    <p:sldId id="265" r:id="rId4"/>
+    <p:sldId id="266" r:id="rId5"/>
+    <p:sldId id="267" r:id="rId6"/>
+    <p:sldId id="258" r:id="rId7"/>
+    <p:sldId id="262" r:id="rId8"/>
+    <p:sldId id="268" r:id="rId9"/>
+    <p:sldId id="259" r:id="rId10"/>
+    <p:sldId id="263" r:id="rId11"/>
+    <p:sldId id="260" r:id="rId12"/>
+    <p:sldId id="264" r:id="rId13"/>
+    <p:sldId id="261" r:id="rId14"/>
   </p:sldIdLst>
   <p:sldSz cx="12192000" cy="6858000"/>
   <p:notesSz cx="6858000" cy="9144000"/>
@@ -288,7 +292,7 @@
           <a:p>
             <a:fld id="{0124091A-53C6-413B-ACA2-50D8C00FFCBD}" type="datetimeFigureOut">
               <a:rPr lang="vi-VN" smtClean="0"/>
-              <a:t>07/03/2017</a:t>
+              <a:t>13/03/2017</a:t>
             </a:fld>
             <a:endParaRPr lang="vi-VN"/>
           </a:p>
@@ -516,7 +520,7 @@
           <a:p>
             <a:fld id="{0124091A-53C6-413B-ACA2-50D8C00FFCBD}" type="datetimeFigureOut">
               <a:rPr lang="vi-VN" smtClean="0"/>
-              <a:t>07/03/2017</a:t>
+              <a:t>13/03/2017</a:t>
             </a:fld>
             <a:endParaRPr lang="vi-VN"/>
           </a:p>
@@ -696,7 +700,7 @@
           <a:p>
             <a:fld id="{0124091A-53C6-413B-ACA2-50D8C00FFCBD}" type="datetimeFigureOut">
               <a:rPr lang="vi-VN" smtClean="0"/>
-              <a:t>07/03/2017</a:t>
+              <a:t>13/03/2017</a:t>
             </a:fld>
             <a:endParaRPr lang="vi-VN"/>
           </a:p>
@@ -866,7 +870,7 @@
           <a:p>
             <a:fld id="{0124091A-53C6-413B-ACA2-50D8C00FFCBD}" type="datetimeFigureOut">
               <a:rPr lang="vi-VN" smtClean="0"/>
-              <a:t>07/03/2017</a:t>
+              <a:t>13/03/2017</a:t>
             </a:fld>
             <a:endParaRPr lang="vi-VN"/>
           </a:p>
@@ -1120,7 +1124,7 @@
           <a:p>
             <a:fld id="{0124091A-53C6-413B-ACA2-50D8C00FFCBD}" type="datetimeFigureOut">
               <a:rPr lang="vi-VN" smtClean="0"/>
-              <a:t>07/03/2017</a:t>
+              <a:t>13/03/2017</a:t>
             </a:fld>
             <a:endParaRPr lang="vi-VN"/>
           </a:p>
@@ -1446,7 +1450,7 @@
           <a:p>
             <a:fld id="{0124091A-53C6-413B-ACA2-50D8C00FFCBD}" type="datetimeFigureOut">
               <a:rPr lang="vi-VN" smtClean="0"/>
-              <a:t>07/03/2017</a:t>
+              <a:t>13/03/2017</a:t>
             </a:fld>
             <a:endParaRPr lang="vi-VN"/>
           </a:p>
@@ -1897,7 +1901,7 @@
           <a:p>
             <a:fld id="{0124091A-53C6-413B-ACA2-50D8C00FFCBD}" type="datetimeFigureOut">
               <a:rPr lang="vi-VN" smtClean="0"/>
-              <a:t>07/03/2017</a:t>
+              <a:t>13/03/2017</a:t>
             </a:fld>
             <a:endParaRPr lang="vi-VN"/>
           </a:p>
@@ -2015,7 +2019,7 @@
           <a:p>
             <a:fld id="{0124091A-53C6-413B-ACA2-50D8C00FFCBD}" type="datetimeFigureOut">
               <a:rPr lang="vi-VN" smtClean="0"/>
-              <a:t>07/03/2017</a:t>
+              <a:t>13/03/2017</a:t>
             </a:fld>
             <a:endParaRPr lang="vi-VN"/>
           </a:p>
@@ -2110,7 +2114,7 @@
           <a:p>
             <a:fld id="{0124091A-53C6-413B-ACA2-50D8C00FFCBD}" type="datetimeFigureOut">
               <a:rPr lang="vi-VN" smtClean="0"/>
-              <a:t>07/03/2017</a:t>
+              <a:t>13/03/2017</a:t>
             </a:fld>
             <a:endParaRPr lang="vi-VN"/>
           </a:p>
@@ -2397,7 +2401,7 @@
           <a:p>
             <a:fld id="{0124091A-53C6-413B-ACA2-50D8C00FFCBD}" type="datetimeFigureOut">
               <a:rPr lang="vi-VN" smtClean="0"/>
-              <a:t>07/03/2017</a:t>
+              <a:t>13/03/2017</a:t>
             </a:fld>
             <a:endParaRPr lang="vi-VN"/>
           </a:p>
@@ -2719,7 +2723,7 @@
           <a:p>
             <a:fld id="{0124091A-53C6-413B-ACA2-50D8C00FFCBD}" type="datetimeFigureOut">
               <a:rPr lang="vi-VN" smtClean="0"/>
-              <a:t>07/03/2017</a:t>
+              <a:t>13/03/2017</a:t>
             </a:fld>
             <a:endParaRPr lang="vi-VN"/>
           </a:p>
@@ -2973,7 +2977,7 @@
           <a:p>
             <a:fld id="{0124091A-53C6-413B-ACA2-50D8C00FFCBD}" type="datetimeFigureOut">
               <a:rPr lang="vi-VN" smtClean="0"/>
-              <a:t>07/03/2017</a:t>
+              <a:t>13/03/2017</a:t>
             </a:fld>
             <a:endParaRPr lang="vi-VN"/>
           </a:p>
@@ -3564,645 +3568,7 @@
 </p:sld>
 </file>
 
-<file path=ppt/slides/slide2.xml><?xml version="1.0" encoding="utf-8"?>
-<p:sld xmlns:a="http://schemas.openxmlformats.org/drawingml/2006/main" xmlns:r="http://schemas.openxmlformats.org/officeDocument/2006/relationships" xmlns:p="http://schemas.openxmlformats.org/presentationml/2006/main">
-  <p:cSld>
-    <p:spTree>
-      <p:nvGrpSpPr>
-        <p:cNvPr id="1" name=""/>
-        <p:cNvGrpSpPr/>
-        <p:nvPr/>
-      </p:nvGrpSpPr>
-      <p:grpSpPr>
-        <a:xfrm>
-          <a:off x="0" y="0"/>
-          <a:ext cx="0" cy="0"/>
-          <a:chOff x="0" y="0"/>
-          <a:chExt cx="0" cy="0"/>
-        </a:xfrm>
-      </p:grpSpPr>
-      <p:sp>
-        <p:nvSpPr>
-          <p:cNvPr id="2" name="Title 1"/>
-          <p:cNvSpPr>
-            <a:spLocks noGrp="1"/>
-          </p:cNvSpPr>
-          <p:nvPr>
-            <p:ph type="title"/>
-          </p:nvPr>
-        </p:nvSpPr>
-        <p:spPr/>
-        <p:txBody>
-          <a:bodyPr/>
-          <a:lstStyle/>
-          <a:p>
-            <a:r>
-              <a:rPr lang="en-US" smtClean="0">
-                <a:latin typeface="Times New Roman" panose="02020603050405020304" pitchFamily="18" charset="0"/>
-                <a:cs typeface="Times New Roman" panose="02020603050405020304" pitchFamily="18" charset="0"/>
-              </a:rPr>
-              <a:t>CHƯƠNG 1: MỞ ĐẦU</a:t>
-            </a:r>
-            <a:endParaRPr lang="vi-VN">
-              <a:latin typeface="Times New Roman" panose="02020603050405020304" pitchFamily="18" charset="0"/>
-              <a:cs typeface="Times New Roman" panose="02020603050405020304" pitchFamily="18" charset="0"/>
-            </a:endParaRPr>
-          </a:p>
-        </p:txBody>
-      </p:sp>
-      <p:sp>
-        <p:nvSpPr>
-          <p:cNvPr id="3" name="Content Placeholder 2"/>
-          <p:cNvSpPr>
-            <a:spLocks noGrp="1"/>
-          </p:cNvSpPr>
-          <p:nvPr>
-            <p:ph idx="1"/>
-          </p:nvPr>
-        </p:nvSpPr>
-        <p:spPr/>
-        <p:txBody>
-          <a:bodyPr>
-            <a:normAutofit/>
-          </a:bodyPr>
-          <a:lstStyle/>
-          <a:p>
-            <a:r>
-              <a:rPr lang="en-US" sz="3000" smtClean="0">
-                <a:latin typeface="Times New Roman" panose="02020603050405020304" pitchFamily="18" charset="0"/>
-                <a:cs typeface="Times New Roman" panose="02020603050405020304" pitchFamily="18" charset="0"/>
-              </a:rPr>
-              <a:t>Giới </a:t>
-            </a:r>
-            <a:r>
-              <a:rPr lang="en-US" sz="3000">
-                <a:latin typeface="Times New Roman" panose="02020603050405020304" pitchFamily="18" charset="0"/>
-                <a:cs typeface="Times New Roman" panose="02020603050405020304" pitchFamily="18" charset="0"/>
-              </a:rPr>
-              <a:t>Thiệu Hệ Thống Hỏi Đáp Tự </a:t>
-            </a:r>
-            <a:r>
-              <a:rPr lang="en-US" sz="3000" smtClean="0">
-                <a:latin typeface="Times New Roman" panose="02020603050405020304" pitchFamily="18" charset="0"/>
-                <a:cs typeface="Times New Roman" panose="02020603050405020304" pitchFamily="18" charset="0"/>
-              </a:rPr>
-              <a:t>Động</a:t>
-            </a:r>
-          </a:p>
-          <a:p>
-            <a:r>
-              <a:rPr lang="en-US" sz="3000">
-                <a:latin typeface="Times New Roman" panose="02020603050405020304" pitchFamily="18" charset="0"/>
-                <a:cs typeface="Times New Roman" panose="02020603050405020304" pitchFamily="18" charset="0"/>
-              </a:rPr>
-              <a:t>Mục đích đề </a:t>
-            </a:r>
-            <a:r>
-              <a:rPr lang="en-US" sz="3000" smtClean="0">
-                <a:latin typeface="Times New Roman" panose="02020603050405020304" pitchFamily="18" charset="0"/>
-                <a:cs typeface="Times New Roman" panose="02020603050405020304" pitchFamily="18" charset="0"/>
-              </a:rPr>
-              <a:t>tài</a:t>
-            </a:r>
-          </a:p>
-          <a:p>
-            <a:r>
-              <a:rPr lang="en-US" sz="3000">
-                <a:latin typeface="Times New Roman" panose="02020603050405020304" pitchFamily="18" charset="0"/>
-                <a:cs typeface="Times New Roman" panose="02020603050405020304" pitchFamily="18" charset="0"/>
-              </a:rPr>
-              <a:t>Các nghiên cứu liên quan</a:t>
-            </a:r>
-            <a:endParaRPr lang="en-US" sz="3000" smtClean="0">
-              <a:latin typeface="Times New Roman" panose="02020603050405020304" pitchFamily="18" charset="0"/>
-              <a:cs typeface="Times New Roman" panose="02020603050405020304" pitchFamily="18" charset="0"/>
-            </a:endParaRPr>
-          </a:p>
-          <a:p>
-            <a:r>
-              <a:rPr lang="en-US" sz="3000">
-                <a:latin typeface="Times New Roman" panose="02020603050405020304" pitchFamily="18" charset="0"/>
-                <a:cs typeface="Times New Roman" panose="02020603050405020304" pitchFamily="18" charset="0"/>
-              </a:rPr>
-              <a:t>Đối tượng và phạm vi nghiên cứu</a:t>
-            </a:r>
-            <a:endParaRPr lang="vi-VN" sz="3000">
-              <a:latin typeface="Times New Roman" panose="02020603050405020304" pitchFamily="18" charset="0"/>
-              <a:cs typeface="Times New Roman" panose="02020603050405020304" pitchFamily="18" charset="0"/>
-            </a:endParaRPr>
-          </a:p>
-        </p:txBody>
-      </p:sp>
-    </p:spTree>
-    <p:extLst>
-      <p:ext uri="{BB962C8B-B14F-4D97-AF65-F5344CB8AC3E}">
-        <p14:creationId xmlns:p14="http://schemas.microsoft.com/office/powerpoint/2010/main" val="1959882576"/>
-      </p:ext>
-    </p:extLst>
-  </p:cSld>
-  <p:clrMapOvr>
-    <a:masterClrMapping/>
-  </p:clrMapOvr>
-  <p:timing>
-    <p:tnLst>
-      <p:par>
-        <p:cTn id="1" dur="indefinite" restart="never" nodeType="tmRoot"/>
-      </p:par>
-    </p:tnLst>
-  </p:timing>
-</p:sld>
-</file>
-
-<file path=ppt/slides/slide3.xml><?xml version="1.0" encoding="utf-8"?>
-<p:sld xmlns:a="http://schemas.openxmlformats.org/drawingml/2006/main" xmlns:r="http://schemas.openxmlformats.org/officeDocument/2006/relationships" xmlns:p="http://schemas.openxmlformats.org/presentationml/2006/main">
-  <p:cSld>
-    <p:spTree>
-      <p:nvGrpSpPr>
-        <p:cNvPr id="1" name=""/>
-        <p:cNvGrpSpPr/>
-        <p:nvPr/>
-      </p:nvGrpSpPr>
-      <p:grpSpPr>
-        <a:xfrm>
-          <a:off x="0" y="0"/>
-          <a:ext cx="0" cy="0"/>
-          <a:chOff x="0" y="0"/>
-          <a:chExt cx="0" cy="0"/>
-        </a:xfrm>
-      </p:grpSpPr>
-      <p:sp>
-        <p:nvSpPr>
-          <p:cNvPr id="2" name="Title 1"/>
-          <p:cNvSpPr>
-            <a:spLocks noGrp="1"/>
-          </p:cNvSpPr>
-          <p:nvPr>
-            <p:ph type="title"/>
-          </p:nvPr>
-        </p:nvSpPr>
-        <p:spPr/>
-        <p:txBody>
-          <a:bodyPr/>
-          <a:lstStyle/>
-          <a:p>
-            <a:r>
-              <a:rPr lang="en-US">
-                <a:latin typeface="Times New Roman" panose="02020603050405020304" pitchFamily="18" charset="0"/>
-                <a:cs typeface="Times New Roman" panose="02020603050405020304" pitchFamily="18" charset="0"/>
-              </a:rPr>
-              <a:t>CHƯƠNG </a:t>
-            </a:r>
-            <a:r>
-              <a:rPr lang="en-US" smtClean="0">
-                <a:latin typeface="Times New Roman" panose="02020603050405020304" pitchFamily="18" charset="0"/>
-                <a:cs typeface="Times New Roman" panose="02020603050405020304" pitchFamily="18" charset="0"/>
-              </a:rPr>
-              <a:t>2: XÂY </a:t>
-            </a:r>
-            <a:r>
-              <a:rPr lang="en-US">
-                <a:latin typeface="Times New Roman" panose="02020603050405020304" pitchFamily="18" charset="0"/>
-                <a:cs typeface="Times New Roman" panose="02020603050405020304" pitchFamily="18" charset="0"/>
-              </a:rPr>
-              <a:t>DỰNG HỆ THỐNG</a:t>
-            </a:r>
-            <a:r>
-              <a:rPr lang="vi-VN"/>
-              <a:t/>
-            </a:r>
-            <a:br>
-              <a:rPr lang="vi-VN"/>
-            </a:br>
-            <a:endParaRPr lang="vi-VN"/>
-          </a:p>
-        </p:txBody>
-      </p:sp>
-      <p:sp>
-        <p:nvSpPr>
-          <p:cNvPr id="3" name="Content Placeholder 2"/>
-          <p:cNvSpPr>
-            <a:spLocks noGrp="1"/>
-          </p:cNvSpPr>
-          <p:nvPr>
-            <p:ph idx="1"/>
-          </p:nvPr>
-        </p:nvSpPr>
-        <p:spPr/>
-        <p:txBody>
-          <a:bodyPr>
-            <a:noAutofit/>
-          </a:bodyPr>
-          <a:lstStyle/>
-          <a:p>
-            <a:r>
-              <a:rPr lang="en-US" sz="2800" smtClean="0">
-                <a:latin typeface="Times New Roman" panose="02020603050405020304" pitchFamily="18" charset="0"/>
-                <a:cs typeface="Times New Roman" panose="02020603050405020304" pitchFamily="18" charset="0"/>
-              </a:rPr>
-              <a:t>Kiến </a:t>
-            </a:r>
-            <a:r>
-              <a:rPr lang="en-US" sz="2800">
-                <a:latin typeface="Times New Roman" panose="02020603050405020304" pitchFamily="18" charset="0"/>
-                <a:cs typeface="Times New Roman" panose="02020603050405020304" pitchFamily="18" charset="0"/>
-              </a:rPr>
-              <a:t>trúc tổng quan của hệ </a:t>
-            </a:r>
-            <a:r>
-              <a:rPr lang="en-US" sz="2800" smtClean="0">
-                <a:latin typeface="Times New Roman" panose="02020603050405020304" pitchFamily="18" charset="0"/>
-                <a:cs typeface="Times New Roman" panose="02020603050405020304" pitchFamily="18" charset="0"/>
-              </a:rPr>
-              <a:t>thống</a:t>
-            </a:r>
-          </a:p>
-          <a:p>
-            <a:r>
-              <a:rPr lang="en-US" sz="2800">
-                <a:latin typeface="Times New Roman" panose="02020603050405020304" pitchFamily="18" charset="0"/>
-                <a:cs typeface="Times New Roman" panose="02020603050405020304" pitchFamily="18" charset="0"/>
-              </a:rPr>
-              <a:t>Thiết kế hệ </a:t>
-            </a:r>
-            <a:r>
-              <a:rPr lang="en-US" sz="2800" smtClean="0">
-                <a:latin typeface="Times New Roman" panose="02020603050405020304" pitchFamily="18" charset="0"/>
-                <a:cs typeface="Times New Roman" panose="02020603050405020304" pitchFamily="18" charset="0"/>
-              </a:rPr>
-              <a:t>thống(Mô Hình Use case,Sequence,Class Diagram)</a:t>
-            </a:r>
-          </a:p>
-          <a:p>
-            <a:r>
-              <a:rPr lang="en-US" sz="2800" smtClean="0">
-                <a:latin typeface="Times New Roman" panose="02020603050405020304" pitchFamily="18" charset="0"/>
-                <a:cs typeface="Times New Roman" panose="02020603050405020304" pitchFamily="18" charset="0"/>
-              </a:rPr>
-              <a:t>Thiết kế và xây dựng cơ sở dữ liệu </a:t>
-            </a:r>
-          </a:p>
-          <a:p>
-            <a:r>
-              <a:rPr lang="en-US" sz="2800" smtClean="0">
-                <a:latin typeface="Times New Roman" panose="02020603050405020304" pitchFamily="18" charset="0"/>
-                <a:cs typeface="Times New Roman" panose="02020603050405020304" pitchFamily="18" charset="0"/>
-              </a:rPr>
-              <a:t>Kiến trúc web: Mô hình MVC và công cụ hiện thực MEAN JS</a:t>
-            </a:r>
-          </a:p>
-          <a:p>
-            <a:r>
-              <a:rPr lang="en-US" sz="2800" smtClean="0">
-                <a:latin typeface="Times New Roman" panose="02020603050405020304" pitchFamily="18" charset="0"/>
-                <a:cs typeface="Times New Roman" panose="02020603050405020304" pitchFamily="18" charset="0"/>
-              </a:rPr>
-              <a:t>Kiến trúc mobile: Mô hình Module và công cụ hiện thực</a:t>
-            </a:r>
-            <a:endParaRPr lang="vi-VN" sz="2800">
-              <a:latin typeface="Times New Roman" panose="02020603050405020304" pitchFamily="18" charset="0"/>
-              <a:cs typeface="Times New Roman" panose="02020603050405020304" pitchFamily="18" charset="0"/>
-            </a:endParaRPr>
-          </a:p>
-        </p:txBody>
-      </p:sp>
-    </p:spTree>
-    <p:extLst>
-      <p:ext uri="{BB962C8B-B14F-4D97-AF65-F5344CB8AC3E}">
-        <p14:creationId xmlns:p14="http://schemas.microsoft.com/office/powerpoint/2010/main" val="702421245"/>
-      </p:ext>
-    </p:extLst>
-  </p:cSld>
-  <p:clrMapOvr>
-    <a:masterClrMapping/>
-  </p:clrMapOvr>
-  <p:timing>
-    <p:tnLst>
-      <p:par>
-        <p:cTn id="1" dur="indefinite" restart="never" nodeType="tmRoot"/>
-      </p:par>
-    </p:tnLst>
-  </p:timing>
-</p:sld>
-</file>
-
-<file path=ppt/slides/slide4.xml><?xml version="1.0" encoding="utf-8"?>
-<p:sld xmlns:a="http://schemas.openxmlformats.org/drawingml/2006/main" xmlns:r="http://schemas.openxmlformats.org/officeDocument/2006/relationships" xmlns:p="http://schemas.openxmlformats.org/presentationml/2006/main">
-  <p:cSld>
-    <p:spTree>
-      <p:nvGrpSpPr>
-        <p:cNvPr id="1" name=""/>
-        <p:cNvGrpSpPr/>
-        <p:nvPr/>
-      </p:nvGrpSpPr>
-      <p:grpSpPr>
-        <a:xfrm>
-          <a:off x="0" y="0"/>
-          <a:ext cx="0" cy="0"/>
-          <a:chOff x="0" y="0"/>
-          <a:chExt cx="0" cy="0"/>
-        </a:xfrm>
-      </p:grpSpPr>
-      <p:sp>
-        <p:nvSpPr>
-          <p:cNvPr id="2" name="Title 1"/>
-          <p:cNvSpPr>
-            <a:spLocks noGrp="1"/>
-          </p:cNvSpPr>
-          <p:nvPr>
-            <p:ph type="title"/>
-          </p:nvPr>
-        </p:nvSpPr>
-        <p:spPr/>
-        <p:txBody>
-          <a:bodyPr/>
-          <a:lstStyle/>
-          <a:p>
-            <a:r>
-              <a:rPr lang="en-US" sz="4400" smtClean="0">
-                <a:latin typeface="Times New Roman" panose="02020603050405020304" pitchFamily="18" charset="0"/>
-                <a:cs typeface="Times New Roman" panose="02020603050405020304" pitchFamily="18" charset="0"/>
-              </a:rPr>
-              <a:t>Kiến </a:t>
-            </a:r>
-            <a:r>
-              <a:rPr lang="en-US" sz="4400">
-                <a:latin typeface="Times New Roman" panose="02020603050405020304" pitchFamily="18" charset="0"/>
-                <a:cs typeface="Times New Roman" panose="02020603050405020304" pitchFamily="18" charset="0"/>
-              </a:rPr>
-              <a:t>trúc tổng quan của hệ thống</a:t>
-            </a:r>
-            <a:br>
-              <a:rPr lang="en-US" sz="4400">
-                <a:latin typeface="Times New Roman" panose="02020603050405020304" pitchFamily="18" charset="0"/>
-                <a:cs typeface="Times New Roman" panose="02020603050405020304" pitchFamily="18" charset="0"/>
-              </a:rPr>
-            </a:br>
-            <a:endParaRPr lang="vi-VN"/>
-          </a:p>
-        </p:txBody>
-      </p:sp>
-      <p:pic>
-        <p:nvPicPr>
-          <p:cNvPr id="4" name="Content Placeholder 3"/>
-          <p:cNvPicPr>
-            <a:picLocks noGrp="1"/>
-          </p:cNvPicPr>
-          <p:nvPr>
-            <p:ph idx="1"/>
-          </p:nvPr>
-        </p:nvPicPr>
-        <p:blipFill>
-          <a:blip r:embed="rId2">
-            <a:extLst>
-              <a:ext uri="{28A0092B-C50C-407E-A947-70E740481C1C}">
-                <a14:useLocalDpi xmlns:a14="http://schemas.microsoft.com/office/drawing/2010/main" val="0"/>
-              </a:ext>
-            </a:extLst>
-          </a:blip>
-          <a:stretch>
-            <a:fillRect/>
-          </a:stretch>
-        </p:blipFill>
-        <p:spPr bwMode="auto">
-          <a:xfrm>
-            <a:off x="920678" y="1472958"/>
-            <a:ext cx="9692640" cy="4832308"/>
-          </a:xfrm>
-          <a:prstGeom prst="rect">
-            <a:avLst/>
-          </a:prstGeom>
-          <a:noFill/>
-          <a:ln>
-            <a:noFill/>
-          </a:ln>
-        </p:spPr>
-      </p:pic>
-    </p:spTree>
-    <p:extLst>
-      <p:ext uri="{BB962C8B-B14F-4D97-AF65-F5344CB8AC3E}">
-        <p14:creationId xmlns:p14="http://schemas.microsoft.com/office/powerpoint/2010/main" val="3714632600"/>
-      </p:ext>
-    </p:extLst>
-  </p:cSld>
-  <p:clrMapOvr>
-    <a:masterClrMapping/>
-  </p:clrMapOvr>
-  <p:timing>
-    <p:tnLst>
-      <p:par>
-        <p:cTn id="1" dur="indefinite" restart="never" nodeType="tmRoot"/>
-      </p:par>
-    </p:tnLst>
-  </p:timing>
-</p:sld>
-</file>
-
-<file path=ppt/slides/slide5.xml><?xml version="1.0" encoding="utf-8"?>
-<p:sld xmlns:a="http://schemas.openxmlformats.org/drawingml/2006/main" xmlns:r="http://schemas.openxmlformats.org/officeDocument/2006/relationships" xmlns:p="http://schemas.openxmlformats.org/presentationml/2006/main">
-  <p:cSld>
-    <p:spTree>
-      <p:nvGrpSpPr>
-        <p:cNvPr id="1" name=""/>
-        <p:cNvGrpSpPr/>
-        <p:nvPr/>
-      </p:nvGrpSpPr>
-      <p:grpSpPr>
-        <a:xfrm>
-          <a:off x="0" y="0"/>
-          <a:ext cx="0" cy="0"/>
-          <a:chOff x="0" y="0"/>
-          <a:chExt cx="0" cy="0"/>
-        </a:xfrm>
-      </p:grpSpPr>
-      <p:sp>
-        <p:nvSpPr>
-          <p:cNvPr id="2" name="Title 1"/>
-          <p:cNvSpPr>
-            <a:spLocks noGrp="1"/>
-          </p:cNvSpPr>
-          <p:nvPr>
-            <p:ph type="title"/>
-          </p:nvPr>
-        </p:nvSpPr>
-        <p:spPr/>
-        <p:txBody>
-          <a:bodyPr>
-            <a:normAutofit fontScale="90000"/>
-          </a:bodyPr>
-          <a:lstStyle/>
-          <a:p>
-            <a:r>
-              <a:rPr lang="en-US">
-                <a:latin typeface="Times New Roman" panose="02020603050405020304" pitchFamily="18" charset="0"/>
-                <a:cs typeface="Times New Roman" panose="02020603050405020304" pitchFamily="18" charset="0"/>
-              </a:rPr>
-              <a:t>CHƯƠNG 3 – </a:t>
-            </a:r>
-            <a:r>
-              <a:rPr lang="en-US" smtClean="0">
-                <a:latin typeface="Times New Roman" panose="02020603050405020304" pitchFamily="18" charset="0"/>
-                <a:cs typeface="Times New Roman" panose="02020603050405020304" pitchFamily="18" charset="0"/>
-              </a:rPr>
-              <a:t>XÂY </a:t>
-            </a:r>
-            <a:r>
-              <a:rPr lang="en-US">
-                <a:latin typeface="Times New Roman" panose="02020603050405020304" pitchFamily="18" charset="0"/>
-                <a:cs typeface="Times New Roman" panose="02020603050405020304" pitchFamily="18" charset="0"/>
-              </a:rPr>
-              <a:t>DỰNG CƠ CHẾ TRẢ LỜI TỰ ĐỘNG</a:t>
-            </a:r>
-            <a:r>
-              <a:rPr lang="vi-VN">
-                <a:latin typeface="Times New Roman" panose="02020603050405020304" pitchFamily="18" charset="0"/>
-                <a:cs typeface="Times New Roman" panose="02020603050405020304" pitchFamily="18" charset="0"/>
-              </a:rPr>
-              <a:t/>
-            </a:r>
-            <a:br>
-              <a:rPr lang="vi-VN">
-                <a:latin typeface="Times New Roman" panose="02020603050405020304" pitchFamily="18" charset="0"/>
-                <a:cs typeface="Times New Roman" panose="02020603050405020304" pitchFamily="18" charset="0"/>
-              </a:rPr>
-            </a:br>
-            <a:endParaRPr lang="vi-VN">
-              <a:latin typeface="Times New Roman" panose="02020603050405020304" pitchFamily="18" charset="0"/>
-              <a:cs typeface="Times New Roman" panose="02020603050405020304" pitchFamily="18" charset="0"/>
-            </a:endParaRPr>
-          </a:p>
-        </p:txBody>
-      </p:sp>
-      <p:sp>
-        <p:nvSpPr>
-          <p:cNvPr id="3" name="Content Placeholder 2"/>
-          <p:cNvSpPr>
-            <a:spLocks noGrp="1"/>
-          </p:cNvSpPr>
-          <p:nvPr>
-            <p:ph idx="1"/>
-          </p:nvPr>
-        </p:nvSpPr>
-        <p:spPr/>
-        <p:txBody>
-          <a:bodyPr>
-            <a:normAutofit/>
-          </a:bodyPr>
-          <a:lstStyle/>
-          <a:p>
-            <a:r>
-              <a:rPr lang="en-US" sz="2800">
-                <a:latin typeface="Times New Roman" panose="02020603050405020304" pitchFamily="18" charset="0"/>
-                <a:cs typeface="Times New Roman" panose="02020603050405020304" pitchFamily="18" charset="0"/>
-              </a:rPr>
-              <a:t>Kiến trúc tổng </a:t>
-            </a:r>
-            <a:r>
-              <a:rPr lang="en-US" sz="2800" smtClean="0">
-                <a:latin typeface="Times New Roman" panose="02020603050405020304" pitchFamily="18" charset="0"/>
-                <a:cs typeface="Times New Roman" panose="02020603050405020304" pitchFamily="18" charset="0"/>
-              </a:rPr>
-              <a:t>quan</a:t>
-            </a:r>
-            <a:r>
-              <a:rPr lang="vi-VN" sz="2800" smtClean="0">
-                <a:latin typeface="Times New Roman" panose="02020603050405020304" pitchFamily="18" charset="0"/>
-                <a:cs typeface="Times New Roman" panose="02020603050405020304" pitchFamily="18" charset="0"/>
-              </a:rPr>
-              <a:t> hệ thống trả lời tự động</a:t>
-            </a:r>
-          </a:p>
-          <a:p>
-            <a:r>
-              <a:rPr lang="en-US" sz="2800" smtClean="0">
-                <a:latin typeface="Times New Roman" panose="02020603050405020304" pitchFamily="18" charset="0"/>
-                <a:cs typeface="Times New Roman" panose="02020603050405020304" pitchFamily="18" charset="0"/>
-              </a:rPr>
-              <a:t>Lọc </a:t>
-            </a:r>
-            <a:r>
-              <a:rPr lang="en-US" sz="2800">
-                <a:latin typeface="Times New Roman" panose="02020603050405020304" pitchFamily="18" charset="0"/>
-                <a:cs typeface="Times New Roman" panose="02020603050405020304" pitchFamily="18" charset="0"/>
-              </a:rPr>
-              <a:t>dữ liệu sử dụng Full Text </a:t>
-            </a:r>
-            <a:r>
-              <a:rPr lang="en-US" sz="2800" smtClean="0">
-                <a:latin typeface="Times New Roman" panose="02020603050405020304" pitchFamily="18" charset="0"/>
-                <a:cs typeface="Times New Roman" panose="02020603050405020304" pitchFamily="18" charset="0"/>
-              </a:rPr>
-              <a:t>Search</a:t>
-            </a:r>
-          </a:p>
-          <a:p>
-            <a:r>
-              <a:rPr lang="en-US" sz="2800">
-                <a:latin typeface="Times New Roman" panose="02020603050405020304" pitchFamily="18" charset="0"/>
-                <a:cs typeface="Times New Roman" panose="02020603050405020304" pitchFamily="18" charset="0"/>
-              </a:rPr>
-              <a:t>Tách từ</a:t>
-            </a:r>
-            <a:endParaRPr lang="en-US" sz="2800" smtClean="0">
-              <a:latin typeface="Times New Roman" panose="02020603050405020304" pitchFamily="18" charset="0"/>
-              <a:cs typeface="Times New Roman" panose="02020603050405020304" pitchFamily="18" charset="0"/>
-            </a:endParaRPr>
-          </a:p>
-          <a:p>
-            <a:r>
-              <a:rPr lang="en-US" sz="2800">
-                <a:latin typeface="Times New Roman" panose="02020603050405020304" pitchFamily="18" charset="0"/>
-                <a:cs typeface="Times New Roman" panose="02020603050405020304" pitchFamily="18" charset="0"/>
-              </a:rPr>
-              <a:t>Phân loại câu hỏi sử dụng Maximum entropy classifier</a:t>
-            </a:r>
-            <a:endParaRPr lang="en-US" sz="2800" smtClean="0">
-              <a:latin typeface="Times New Roman" panose="02020603050405020304" pitchFamily="18" charset="0"/>
-              <a:cs typeface="Times New Roman" panose="02020603050405020304" pitchFamily="18" charset="0"/>
-            </a:endParaRPr>
-          </a:p>
-          <a:p>
-            <a:r>
-              <a:rPr lang="fr-FR" sz="2800">
-                <a:latin typeface="Times New Roman" panose="02020603050405020304" pitchFamily="18" charset="0"/>
-                <a:cs typeface="Times New Roman" panose="02020603050405020304" pitchFamily="18" charset="0"/>
-              </a:rPr>
-              <a:t>Đo độ tương tự giữa các câu </a:t>
-            </a:r>
-            <a:r>
-              <a:rPr lang="fr-FR" sz="2800" smtClean="0">
-                <a:latin typeface="Times New Roman" panose="02020603050405020304" pitchFamily="18" charset="0"/>
-                <a:cs typeface="Times New Roman" panose="02020603050405020304" pitchFamily="18" charset="0"/>
-              </a:rPr>
-              <a:t>hỏi</a:t>
-            </a:r>
-            <a:endParaRPr lang="vi-VN" sz="2800">
-              <a:latin typeface="Times New Roman" panose="02020603050405020304" pitchFamily="18" charset="0"/>
-              <a:cs typeface="Times New Roman" panose="02020603050405020304" pitchFamily="18" charset="0"/>
-            </a:endParaRPr>
-          </a:p>
-        </p:txBody>
-      </p:sp>
-    </p:spTree>
-    <p:extLst>
-      <p:ext uri="{BB962C8B-B14F-4D97-AF65-F5344CB8AC3E}">
-        <p14:creationId xmlns:p14="http://schemas.microsoft.com/office/powerpoint/2010/main" val="2702124910"/>
-      </p:ext>
-    </p:extLst>
-  </p:cSld>
-  <p:clrMapOvr>
-    <a:masterClrMapping/>
-  </p:clrMapOvr>
-  <p:timing>
-    <p:tnLst>
-      <p:par>
-        <p:cTn id="1" dur="indefinite" restart="never" nodeType="tmRoot"/>
-      </p:par>
-    </p:tnLst>
-  </p:timing>
-</p:sld>
-</file>
-
-<file path=ppt/slides/slide6.xml><?xml version="1.0" encoding="utf-8"?>
+<file path=ppt/slides/slide10.xml><?xml version="1.0" encoding="utf-8"?>
 <p:sld xmlns:a="http://schemas.openxmlformats.org/drawingml/2006/main" xmlns:r="http://schemas.openxmlformats.org/officeDocument/2006/relationships" xmlns:p="http://schemas.openxmlformats.org/presentationml/2006/main">
   <p:cSld>
     <p:spTree>
@@ -4310,7 +3676,7 @@
 </p:sld>
 </file>
 
-<file path=ppt/slides/slide7.xml><?xml version="1.0" encoding="utf-8"?>
+<file path=ppt/slides/slide11.xml><?xml version="1.0" encoding="utf-8"?>
 <p:sld xmlns:a="http://schemas.openxmlformats.org/drawingml/2006/main" xmlns:r="http://schemas.openxmlformats.org/officeDocument/2006/relationships" xmlns:p="http://schemas.openxmlformats.org/presentationml/2006/main">
   <p:cSld>
     <p:spTree>
@@ -4512,7 +3878,7 @@
 </p:sld>
 </file>
 
-<file path=ppt/slides/slide8.xml><?xml version="1.0" encoding="utf-8"?>
+<file path=ppt/slides/slide12.xml><?xml version="1.0" encoding="utf-8"?>
 <p:sld xmlns:a="http://schemas.openxmlformats.org/drawingml/2006/main" xmlns:r="http://schemas.openxmlformats.org/officeDocument/2006/relationships" xmlns:p="http://schemas.openxmlformats.org/presentationml/2006/main">
   <p:cSld>
     <p:spTree>
@@ -4620,6 +3986,1604 @@
 </p:sld>
 </file>
 
+<file path=ppt/slides/slide13.xml><?xml version="1.0" encoding="utf-8"?>
+<p:sld xmlns:a="http://schemas.openxmlformats.org/drawingml/2006/main" xmlns:r="http://schemas.openxmlformats.org/officeDocument/2006/relationships" xmlns:p="http://schemas.openxmlformats.org/presentationml/2006/main">
+  <p:cSld>
+    <p:spTree>
+      <p:nvGrpSpPr>
+        <p:cNvPr id="1" name=""/>
+        <p:cNvGrpSpPr/>
+        <p:nvPr/>
+      </p:nvGrpSpPr>
+      <p:grpSpPr>
+        <a:xfrm>
+          <a:off x="0" y="0"/>
+          <a:ext cx="0" cy="0"/>
+          <a:chOff x="0" y="0"/>
+          <a:chExt cx="0" cy="0"/>
+        </a:xfrm>
+      </p:grpSpPr>
+      <p:sp>
+        <p:nvSpPr>
+          <p:cNvPr id="2" name="Title 1"/>
+          <p:cNvSpPr>
+            <a:spLocks noGrp="1"/>
+          </p:cNvSpPr>
+          <p:nvPr>
+            <p:ph type="title"/>
+          </p:nvPr>
+        </p:nvSpPr>
+        <p:spPr/>
+        <p:txBody>
+          <a:bodyPr/>
+          <a:lstStyle/>
+          <a:p>
+            <a:r>
+              <a:rPr lang="en-US" b="1">
+                <a:latin typeface="Times New Roman" panose="02020603050405020304" pitchFamily="18" charset="0"/>
+                <a:cs typeface="Times New Roman" panose="02020603050405020304" pitchFamily="18" charset="0"/>
+              </a:rPr>
+              <a:t>CHƯƠNG 5– TỔNG KẾT</a:t>
+            </a:r>
+            <a:r>
+              <a:rPr lang="vi-VN" b="1">
+                <a:latin typeface="Times New Roman" panose="02020603050405020304" pitchFamily="18" charset="0"/>
+                <a:cs typeface="Times New Roman" panose="02020603050405020304" pitchFamily="18" charset="0"/>
+              </a:rPr>
+              <a:t/>
+            </a:r>
+            <a:br>
+              <a:rPr lang="vi-VN" b="1">
+                <a:latin typeface="Times New Roman" panose="02020603050405020304" pitchFamily="18" charset="0"/>
+                <a:cs typeface="Times New Roman" panose="02020603050405020304" pitchFamily="18" charset="0"/>
+              </a:rPr>
+            </a:br>
+            <a:endParaRPr lang="vi-VN">
+              <a:latin typeface="Times New Roman" panose="02020603050405020304" pitchFamily="18" charset="0"/>
+              <a:cs typeface="Times New Roman" panose="02020603050405020304" pitchFamily="18" charset="0"/>
+            </a:endParaRPr>
+          </a:p>
+        </p:txBody>
+      </p:sp>
+      <p:sp>
+        <p:nvSpPr>
+          <p:cNvPr id="3" name="Content Placeholder 2"/>
+          <p:cNvSpPr>
+            <a:spLocks noGrp="1"/>
+          </p:cNvSpPr>
+          <p:nvPr>
+            <p:ph idx="1"/>
+          </p:nvPr>
+        </p:nvSpPr>
+        <p:spPr/>
+        <p:txBody>
+          <a:bodyPr/>
+          <a:lstStyle/>
+          <a:p>
+            <a:r>
+              <a:rPr lang="en-US" sz="2800">
+                <a:latin typeface="Times New Roman" panose="02020603050405020304" pitchFamily="18" charset="0"/>
+                <a:cs typeface="Times New Roman" panose="02020603050405020304" pitchFamily="18" charset="0"/>
+              </a:rPr>
+              <a:t>Các vấn đề đã làm được:</a:t>
+            </a:r>
+            <a:endParaRPr lang="vi-VN" sz="2800">
+              <a:latin typeface="Times New Roman" panose="02020603050405020304" pitchFamily="18" charset="0"/>
+              <a:cs typeface="Times New Roman" panose="02020603050405020304" pitchFamily="18" charset="0"/>
+            </a:endParaRPr>
+          </a:p>
+          <a:p>
+            <a:r>
+              <a:rPr lang="en-US" sz="2800">
+                <a:latin typeface="Times New Roman" panose="02020603050405020304" pitchFamily="18" charset="0"/>
+                <a:cs typeface="Times New Roman" panose="02020603050405020304" pitchFamily="18" charset="0"/>
+              </a:rPr>
+              <a:t>Các vấn đề chưa làm được:</a:t>
+            </a:r>
+            <a:endParaRPr lang="vi-VN" sz="2800">
+              <a:latin typeface="Times New Roman" panose="02020603050405020304" pitchFamily="18" charset="0"/>
+              <a:cs typeface="Times New Roman" panose="02020603050405020304" pitchFamily="18" charset="0"/>
+            </a:endParaRPr>
+          </a:p>
+          <a:p>
+            <a:r>
+              <a:rPr lang="en-US" sz="2800">
+                <a:latin typeface="Times New Roman" panose="02020603050405020304" pitchFamily="18" charset="0"/>
+                <a:cs typeface="Times New Roman" panose="02020603050405020304" pitchFamily="18" charset="0"/>
+              </a:rPr>
+              <a:t>Hướng phát triển cho tương </a:t>
+            </a:r>
+            <a:r>
+              <a:rPr lang="en-US" sz="2800" smtClean="0">
+                <a:latin typeface="Times New Roman" panose="02020603050405020304" pitchFamily="18" charset="0"/>
+                <a:cs typeface="Times New Roman" panose="02020603050405020304" pitchFamily="18" charset="0"/>
+              </a:rPr>
+              <a:t>lai</a:t>
+            </a:r>
+            <a:endParaRPr lang="vi-VN" sz="2800">
+              <a:latin typeface="Times New Roman" panose="02020603050405020304" pitchFamily="18" charset="0"/>
+              <a:cs typeface="Times New Roman" panose="02020603050405020304" pitchFamily="18" charset="0"/>
+            </a:endParaRPr>
+          </a:p>
+          <a:p>
+            <a:endParaRPr lang="vi-VN"/>
+          </a:p>
+        </p:txBody>
+      </p:sp>
+    </p:spTree>
+    <p:extLst>
+      <p:ext uri="{BB962C8B-B14F-4D97-AF65-F5344CB8AC3E}">
+        <p14:creationId xmlns:p14="http://schemas.microsoft.com/office/powerpoint/2010/main" val="2787953767"/>
+      </p:ext>
+    </p:extLst>
+  </p:cSld>
+  <p:clrMapOvr>
+    <a:masterClrMapping/>
+  </p:clrMapOvr>
+  <p:timing>
+    <p:tnLst>
+      <p:par>
+        <p:cTn id="1" dur="indefinite" restart="never" nodeType="tmRoot"/>
+      </p:par>
+    </p:tnLst>
+  </p:timing>
+</p:sld>
+</file>
+
+<file path=ppt/slides/slide2.xml><?xml version="1.0" encoding="utf-8"?>
+<p:sld xmlns:a="http://schemas.openxmlformats.org/drawingml/2006/main" xmlns:r="http://schemas.openxmlformats.org/officeDocument/2006/relationships" xmlns:p="http://schemas.openxmlformats.org/presentationml/2006/main">
+  <p:cSld>
+    <p:spTree>
+      <p:nvGrpSpPr>
+        <p:cNvPr id="1" name=""/>
+        <p:cNvGrpSpPr/>
+        <p:nvPr/>
+      </p:nvGrpSpPr>
+      <p:grpSpPr>
+        <a:xfrm>
+          <a:off x="0" y="0"/>
+          <a:ext cx="0" cy="0"/>
+          <a:chOff x="0" y="0"/>
+          <a:chExt cx="0" cy="0"/>
+        </a:xfrm>
+      </p:grpSpPr>
+      <p:sp>
+        <p:nvSpPr>
+          <p:cNvPr id="2" name="Title 1"/>
+          <p:cNvSpPr>
+            <a:spLocks noGrp="1"/>
+          </p:cNvSpPr>
+          <p:nvPr>
+            <p:ph type="title"/>
+          </p:nvPr>
+        </p:nvSpPr>
+        <p:spPr/>
+        <p:txBody>
+          <a:bodyPr>
+            <a:normAutofit/>
+          </a:bodyPr>
+          <a:lstStyle/>
+          <a:p>
+            <a:r>
+              <a:rPr lang="en-US" sz="3800" smtClean="0">
+                <a:latin typeface="Times New Roman" panose="02020603050405020304" pitchFamily="18" charset="0"/>
+                <a:cs typeface="Times New Roman" panose="02020603050405020304" pitchFamily="18" charset="0"/>
+              </a:rPr>
+              <a:t>CHƯƠNG 1: MỞ ĐẦU</a:t>
+            </a:r>
+            <a:endParaRPr lang="vi-VN" sz="3800">
+              <a:latin typeface="Times New Roman" panose="02020603050405020304" pitchFamily="18" charset="0"/>
+              <a:cs typeface="Times New Roman" panose="02020603050405020304" pitchFamily="18" charset="0"/>
+            </a:endParaRPr>
+          </a:p>
+        </p:txBody>
+      </p:sp>
+      <p:sp>
+        <p:nvSpPr>
+          <p:cNvPr id="3" name="Content Placeholder 2"/>
+          <p:cNvSpPr>
+            <a:spLocks noGrp="1"/>
+          </p:cNvSpPr>
+          <p:nvPr>
+            <p:ph idx="1"/>
+          </p:nvPr>
+        </p:nvSpPr>
+        <p:spPr/>
+        <p:txBody>
+          <a:bodyPr>
+            <a:normAutofit/>
+          </a:bodyPr>
+          <a:lstStyle/>
+          <a:p>
+            <a:pPr marL="0" indent="0">
+              <a:buNone/>
+            </a:pPr>
+            <a:r>
+              <a:rPr lang="en-US" sz="2000" b="1" smtClean="0">
+                <a:latin typeface="Times New Roman" panose="02020603050405020304" pitchFamily="18" charset="0"/>
+                <a:cs typeface="Times New Roman" panose="02020603050405020304" pitchFamily="18" charset="0"/>
+              </a:rPr>
+              <a:t>1.Giới </a:t>
+            </a:r>
+            <a:r>
+              <a:rPr lang="en-US" sz="2000" b="1">
+                <a:latin typeface="Times New Roman" panose="02020603050405020304" pitchFamily="18" charset="0"/>
+                <a:cs typeface="Times New Roman" panose="02020603050405020304" pitchFamily="18" charset="0"/>
+              </a:rPr>
+              <a:t>Thiệu Hệ Thống Hỏi Đáp Tự </a:t>
+            </a:r>
+            <a:r>
+              <a:rPr lang="en-US" sz="2000" b="1" smtClean="0">
+                <a:latin typeface="Times New Roman" panose="02020603050405020304" pitchFamily="18" charset="0"/>
+                <a:cs typeface="Times New Roman" panose="02020603050405020304" pitchFamily="18" charset="0"/>
+              </a:rPr>
+              <a:t>Động</a:t>
+            </a:r>
+            <a:r>
+              <a:rPr lang="en-US" sz="2000" smtClean="0">
+                <a:latin typeface="Times New Roman" panose="02020603050405020304" pitchFamily="18" charset="0"/>
+                <a:cs typeface="Times New Roman" panose="02020603050405020304" pitchFamily="18" charset="0"/>
+              </a:rPr>
+              <a:t>:</a:t>
+            </a:r>
+          </a:p>
+          <a:p>
+            <a:pPr marL="548640" lvl="2" indent="0">
+              <a:lnSpc>
+                <a:spcPct val="170000"/>
+              </a:lnSpc>
+              <a:buNone/>
+            </a:pPr>
+            <a:r>
+              <a:rPr lang="en-US" sz="1900" smtClean="0">
+                <a:latin typeface="Times New Roman" panose="02020603050405020304" pitchFamily="18" charset="0"/>
+                <a:cs typeface="Times New Roman" panose="02020603050405020304" pitchFamily="18" charset="0"/>
+              </a:rPr>
+              <a:t>Ngày </a:t>
+            </a:r>
+            <a:r>
+              <a:rPr lang="en-US" sz="1900">
+                <a:latin typeface="Times New Roman" panose="02020603050405020304" pitchFamily="18" charset="0"/>
+                <a:cs typeface="Times New Roman" panose="02020603050405020304" pitchFamily="18" charset="0"/>
+              </a:rPr>
+              <a:t>nay hệ thống internet phát triển với một </a:t>
+            </a:r>
+            <a:r>
+              <a:rPr lang="en-US" sz="1900">
+                <a:latin typeface="Times New Roman" panose="02020603050405020304" pitchFamily="18" charset="0"/>
+                <a:cs typeface="Times New Roman" panose="02020603050405020304" pitchFamily="18" charset="0"/>
+              </a:rPr>
+              <a:t>khối </a:t>
+            </a:r>
+            <a:r>
+              <a:rPr lang="en-US" sz="1900" smtClean="0">
+                <a:latin typeface="Times New Roman" panose="02020603050405020304" pitchFamily="18" charset="0"/>
+                <a:cs typeface="Times New Roman" panose="02020603050405020304" pitchFamily="18" charset="0"/>
+              </a:rPr>
+              <a:t>lượng </a:t>
+            </a:r>
+            <a:r>
+              <a:rPr lang="en-US" sz="1900">
+                <a:latin typeface="Times New Roman" panose="02020603050405020304" pitchFamily="18" charset="0"/>
+                <a:cs typeface="Times New Roman" panose="02020603050405020304" pitchFamily="18" charset="0"/>
+              </a:rPr>
+              <a:t>dữ liệu khổng lồ dẫn đến việc tìm </a:t>
+            </a:r>
+            <a:r>
+              <a:rPr lang="en-US" sz="1900">
+                <a:latin typeface="Times New Roman" panose="02020603050405020304" pitchFamily="18" charset="0"/>
+                <a:cs typeface="Times New Roman" panose="02020603050405020304" pitchFamily="18" charset="0"/>
+              </a:rPr>
+              <a:t>kiếm </a:t>
+            </a:r>
+            <a:r>
+              <a:rPr lang="en-US" sz="1900" smtClean="0">
+                <a:latin typeface="Times New Roman" panose="02020603050405020304" pitchFamily="18" charset="0"/>
+                <a:cs typeface="Times New Roman" panose="02020603050405020304" pitchFamily="18" charset="0"/>
+              </a:rPr>
+              <a:t>thông tin sẽ </a:t>
+            </a:r>
+            <a:r>
+              <a:rPr lang="en-US" sz="1900">
+                <a:latin typeface="Times New Roman" panose="02020603050405020304" pitchFamily="18" charset="0"/>
+                <a:cs typeface="Times New Roman" panose="02020603050405020304" pitchFamily="18" charset="0"/>
+              </a:rPr>
+              <a:t>gặp khó khăn cùng với đó là </a:t>
+            </a:r>
+            <a:r>
+              <a:rPr lang="en-US" sz="1900">
+                <a:latin typeface="Times New Roman" panose="02020603050405020304" pitchFamily="18" charset="0"/>
+                <a:cs typeface="Times New Roman" panose="02020603050405020304" pitchFamily="18" charset="0"/>
+              </a:rPr>
+              <a:t>sự </a:t>
+            </a:r>
+            <a:r>
+              <a:rPr lang="en-US" sz="1900" smtClean="0">
+                <a:latin typeface="Times New Roman" panose="02020603050405020304" pitchFamily="18" charset="0"/>
+                <a:cs typeface="Times New Roman" panose="02020603050405020304" pitchFamily="18" charset="0"/>
+              </a:rPr>
+              <a:t>nguồn thông tin từ nhiều chiều </a:t>
+            </a:r>
+            <a:r>
+              <a:rPr lang="en-US" sz="1900">
+                <a:latin typeface="Times New Roman" panose="02020603050405020304" pitchFamily="18" charset="0"/>
+                <a:cs typeface="Times New Roman" panose="02020603050405020304" pitchFamily="18" charset="0"/>
+              </a:rPr>
+              <a:t>cũng có thể dẫn tới việc nắm bắt sai thông </a:t>
+            </a:r>
+            <a:r>
+              <a:rPr lang="en-US" sz="1900">
+                <a:latin typeface="Times New Roman" panose="02020603050405020304" pitchFamily="18" charset="0"/>
+                <a:cs typeface="Times New Roman" panose="02020603050405020304" pitchFamily="18" charset="0"/>
+              </a:rPr>
+              <a:t>tin</a:t>
+            </a:r>
+            <a:r>
+              <a:rPr lang="en-US" sz="1900" smtClean="0">
+                <a:latin typeface="Times New Roman" panose="02020603050405020304" pitchFamily="18" charset="0"/>
+                <a:cs typeface="Times New Roman" panose="02020603050405020304" pitchFamily="18" charset="0"/>
+              </a:rPr>
+              <a:t>.</a:t>
+            </a:r>
+          </a:p>
+          <a:p>
+            <a:pPr marL="548640" lvl="2" indent="0">
+              <a:buNone/>
+            </a:pPr>
+            <a:endParaRPr lang="en-US" sz="1900" smtClean="0">
+              <a:latin typeface="Times New Roman" panose="02020603050405020304" pitchFamily="18" charset="0"/>
+              <a:cs typeface="Times New Roman" panose="02020603050405020304" pitchFamily="18" charset="0"/>
+            </a:endParaRPr>
+          </a:p>
+          <a:p>
+            <a:pPr marL="548640" lvl="2" indent="0">
+              <a:lnSpc>
+                <a:spcPct val="170000"/>
+              </a:lnSpc>
+              <a:buNone/>
+            </a:pPr>
+            <a:r>
+              <a:rPr lang="en-US" sz="1900">
+                <a:latin typeface="Times New Roman" panose="02020603050405020304" pitchFamily="18" charset="0"/>
+                <a:cs typeface="Times New Roman" panose="02020603050405020304" pitchFamily="18" charset="0"/>
+              </a:rPr>
+              <a:t>Thông tin tìm kiếm đôi khỉ chỉ dừng ở mức tài liệu nghiên cứu, còn hệ thống hỏi đáp sẽ cho ta một câu trả lời ngắn gọn nhất có thể và đôi khi là 1 hướng giải quyết vấn đề từ những người đi trước.</a:t>
+            </a:r>
+            <a:endParaRPr lang="vi-VN" sz="1900">
+              <a:latin typeface="Times New Roman" panose="02020603050405020304" pitchFamily="18" charset="0"/>
+              <a:cs typeface="Times New Roman" panose="02020603050405020304" pitchFamily="18" charset="0"/>
+            </a:endParaRPr>
+          </a:p>
+          <a:p>
+            <a:pPr marL="548640" lvl="2" indent="0">
+              <a:buNone/>
+            </a:pPr>
+            <a:endParaRPr lang="vi-VN" sz="2800"/>
+          </a:p>
+          <a:p>
+            <a:pPr marL="571500" indent="-571500">
+              <a:buFont typeface="+mj-lt"/>
+              <a:buAutoNum type="romanUcPeriod"/>
+            </a:pPr>
+            <a:endParaRPr lang="en-US" sz="3000" smtClean="0">
+              <a:latin typeface="Times New Roman" panose="02020603050405020304" pitchFamily="18" charset="0"/>
+              <a:cs typeface="Times New Roman" panose="02020603050405020304" pitchFamily="18" charset="0"/>
+            </a:endParaRPr>
+          </a:p>
+          <a:p>
+            <a:pPr marL="571500" indent="-571500">
+              <a:buFont typeface="+mj-lt"/>
+              <a:buAutoNum type="romanUcPeriod"/>
+            </a:pPr>
+            <a:endParaRPr lang="en-US" sz="3000">
+              <a:latin typeface="Times New Roman" panose="02020603050405020304" pitchFamily="18" charset="0"/>
+              <a:cs typeface="Times New Roman" panose="02020603050405020304" pitchFamily="18" charset="0"/>
+            </a:endParaRPr>
+          </a:p>
+          <a:p>
+            <a:pPr marL="571500" indent="-571500">
+              <a:buFont typeface="+mj-lt"/>
+              <a:buAutoNum type="romanUcPeriod"/>
+            </a:pPr>
+            <a:endParaRPr lang="en-US" sz="3000" smtClean="0">
+              <a:latin typeface="Times New Roman" panose="02020603050405020304" pitchFamily="18" charset="0"/>
+              <a:cs typeface="Times New Roman" panose="02020603050405020304" pitchFamily="18" charset="0"/>
+            </a:endParaRPr>
+          </a:p>
+          <a:p>
+            <a:pPr marL="571500" indent="-571500">
+              <a:buFont typeface="+mj-lt"/>
+              <a:buAutoNum type="romanUcPeriod"/>
+            </a:pPr>
+            <a:endParaRPr lang="en-US" sz="3000" smtClean="0">
+              <a:latin typeface="Times New Roman" panose="02020603050405020304" pitchFamily="18" charset="0"/>
+              <a:cs typeface="Times New Roman" panose="02020603050405020304" pitchFamily="18" charset="0"/>
+            </a:endParaRPr>
+          </a:p>
+        </p:txBody>
+      </p:sp>
+    </p:spTree>
+    <p:extLst>
+      <p:ext uri="{BB962C8B-B14F-4D97-AF65-F5344CB8AC3E}">
+        <p14:creationId xmlns:p14="http://schemas.microsoft.com/office/powerpoint/2010/main" val="1959882576"/>
+      </p:ext>
+    </p:extLst>
+  </p:cSld>
+  <p:clrMapOvr>
+    <a:masterClrMapping/>
+  </p:clrMapOvr>
+  <p:timing>
+    <p:tnLst>
+      <p:par>
+        <p:cTn id="1" dur="indefinite" restart="never" nodeType="tmRoot"/>
+      </p:par>
+    </p:tnLst>
+  </p:timing>
+</p:sld>
+</file>
+
+<file path=ppt/slides/slide3.xml><?xml version="1.0" encoding="utf-8"?>
+<p:sld xmlns:a="http://schemas.openxmlformats.org/drawingml/2006/main" xmlns:r="http://schemas.openxmlformats.org/officeDocument/2006/relationships" xmlns:p="http://schemas.openxmlformats.org/presentationml/2006/main">
+  <p:cSld>
+    <p:spTree>
+      <p:nvGrpSpPr>
+        <p:cNvPr id="1" name=""/>
+        <p:cNvGrpSpPr/>
+        <p:nvPr/>
+      </p:nvGrpSpPr>
+      <p:grpSpPr>
+        <a:xfrm>
+          <a:off x="0" y="0"/>
+          <a:ext cx="0" cy="0"/>
+          <a:chOff x="0" y="0"/>
+          <a:chExt cx="0" cy="0"/>
+        </a:xfrm>
+      </p:grpSpPr>
+      <p:sp>
+        <p:nvSpPr>
+          <p:cNvPr id="2" name="Title 1"/>
+          <p:cNvSpPr>
+            <a:spLocks noGrp="1"/>
+          </p:cNvSpPr>
+          <p:nvPr>
+            <p:ph type="title"/>
+          </p:nvPr>
+        </p:nvSpPr>
+        <p:spPr>
+          <a:xfrm>
+            <a:off x="374767" y="0"/>
+            <a:ext cx="9692640" cy="1325562"/>
+          </a:xfrm>
+        </p:spPr>
+        <p:txBody>
+          <a:bodyPr/>
+          <a:lstStyle/>
+          <a:p>
+            <a:endParaRPr lang="vi-VN"/>
+          </a:p>
+        </p:txBody>
+      </p:sp>
+      <p:sp>
+        <p:nvSpPr>
+          <p:cNvPr id="3" name="Content Placeholder 2"/>
+          <p:cNvSpPr>
+            <a:spLocks noGrp="1"/>
+          </p:cNvSpPr>
+          <p:nvPr>
+            <p:ph idx="1"/>
+          </p:nvPr>
+        </p:nvSpPr>
+        <p:spPr>
+          <a:xfrm>
+            <a:off x="754515" y="1645420"/>
+            <a:ext cx="8933143" cy="4351337"/>
+          </a:xfrm>
+        </p:spPr>
+        <p:txBody>
+          <a:bodyPr>
+            <a:normAutofit fontScale="92500" lnSpcReduction="10000"/>
+          </a:bodyPr>
+          <a:lstStyle/>
+          <a:p>
+            <a:pPr marL="0" indent="0">
+              <a:buNone/>
+            </a:pPr>
+            <a:r>
+              <a:rPr lang="en-US" sz="2600" b="1">
+                <a:latin typeface="Times New Roman" panose="02020603050405020304" pitchFamily="18" charset="0"/>
+                <a:cs typeface="Times New Roman" panose="02020603050405020304" pitchFamily="18" charset="0"/>
+              </a:rPr>
+              <a:t>Hệ </a:t>
+            </a:r>
+            <a:r>
+              <a:rPr lang="en-US" sz="2200" b="1">
+                <a:latin typeface="Times New Roman" panose="02020603050405020304" pitchFamily="18" charset="0"/>
+                <a:cs typeface="Times New Roman" panose="02020603050405020304" pitchFamily="18" charset="0"/>
+              </a:rPr>
+              <a:t>thống</a:t>
+            </a:r>
+            <a:r>
+              <a:rPr lang="en-US" sz="2600" b="1">
+                <a:latin typeface="Times New Roman" panose="02020603050405020304" pitchFamily="18" charset="0"/>
+                <a:cs typeface="Times New Roman" panose="02020603050405020304" pitchFamily="18" charset="0"/>
+              </a:rPr>
+              <a:t> hỏi đáp là gì:</a:t>
+            </a:r>
+            <a:endParaRPr lang="vi-VN" sz="2600" b="1">
+              <a:latin typeface="Times New Roman" panose="02020603050405020304" pitchFamily="18" charset="0"/>
+              <a:cs typeface="Times New Roman" panose="02020603050405020304" pitchFamily="18" charset="0"/>
+            </a:endParaRPr>
+          </a:p>
+          <a:p>
+            <a:pPr marL="274320" lvl="1" indent="0">
+              <a:lnSpc>
+                <a:spcPct val="150000"/>
+              </a:lnSpc>
+              <a:buNone/>
+            </a:pPr>
+            <a:r>
+              <a:rPr lang="en-US" sz="1900">
+                <a:latin typeface="Times New Roman" panose="02020603050405020304" pitchFamily="18" charset="0"/>
+                <a:cs typeface="Times New Roman" panose="02020603050405020304" pitchFamily="18" charset="0"/>
+              </a:rPr>
+              <a:t>Hệ thống hỏi đáp là hệ thống cho phép người dùng đặt câu hỏi và nhận được câu trả lời về những vấn đề mà họ đang gặp khó khăn và chưa tìm ra hướng </a:t>
+            </a:r>
+            <a:r>
+              <a:rPr lang="en-US" sz="1900">
+                <a:latin typeface="Times New Roman" panose="02020603050405020304" pitchFamily="18" charset="0"/>
+                <a:cs typeface="Times New Roman" panose="02020603050405020304" pitchFamily="18" charset="0"/>
+              </a:rPr>
+              <a:t>giải </a:t>
+            </a:r>
+            <a:r>
+              <a:rPr lang="en-US" sz="1900" smtClean="0">
+                <a:latin typeface="Times New Roman" panose="02020603050405020304" pitchFamily="18" charset="0"/>
+                <a:cs typeface="Times New Roman" panose="02020603050405020304" pitchFamily="18" charset="0"/>
+              </a:rPr>
+              <a:t>quyết đồng thời là </a:t>
+            </a:r>
+            <a:r>
+              <a:rPr lang="en-US" sz="1900">
+                <a:latin typeface="Times New Roman" panose="02020603050405020304" pitchFamily="18" charset="0"/>
+                <a:cs typeface="Times New Roman" panose="02020603050405020304" pitchFamily="18" charset="0"/>
+              </a:rPr>
+              <a:t>nơi tập trung các </a:t>
+            </a:r>
+            <a:r>
+              <a:rPr lang="en-US" sz="1900">
+                <a:latin typeface="Times New Roman" panose="02020603050405020304" pitchFamily="18" charset="0"/>
+                <a:cs typeface="Times New Roman" panose="02020603050405020304" pitchFamily="18" charset="0"/>
+              </a:rPr>
+              <a:t>kiến </a:t>
+            </a:r>
+            <a:r>
+              <a:rPr lang="en-US" sz="1900" smtClean="0">
+                <a:latin typeface="Times New Roman" panose="02020603050405020304" pitchFamily="18" charset="0"/>
+                <a:cs typeface="Times New Roman" panose="02020603050405020304" pitchFamily="18" charset="0"/>
+              </a:rPr>
+              <a:t>thứ, đồng thời cũng </a:t>
+            </a:r>
+            <a:r>
+              <a:rPr lang="en-US" sz="1900">
+                <a:latin typeface="Times New Roman" panose="02020603050405020304" pitchFamily="18" charset="0"/>
+                <a:cs typeface="Times New Roman" panose="02020603050405020304" pitchFamily="18" charset="0"/>
+              </a:rPr>
+              <a:t>là thế giới thông tin mở và là kho tàng </a:t>
+            </a:r>
+            <a:r>
+              <a:rPr lang="en-US" sz="1900">
+                <a:latin typeface="Times New Roman" panose="02020603050405020304" pitchFamily="18" charset="0"/>
+                <a:cs typeface="Times New Roman" panose="02020603050405020304" pitchFamily="18" charset="0"/>
+              </a:rPr>
+              <a:t>kiến </a:t>
+            </a:r>
+            <a:r>
+              <a:rPr lang="en-US" sz="1900" smtClean="0">
+                <a:latin typeface="Times New Roman" panose="02020603050405020304" pitchFamily="18" charset="0"/>
+                <a:cs typeface="Times New Roman" panose="02020603050405020304" pitchFamily="18" charset="0"/>
+              </a:rPr>
+              <a:t>thức.</a:t>
+            </a:r>
+          </a:p>
+          <a:p>
+            <a:pPr marL="274320" lvl="1" indent="0">
+              <a:lnSpc>
+                <a:spcPct val="150000"/>
+              </a:lnSpc>
+              <a:buNone/>
+            </a:pPr>
+            <a:r>
+              <a:rPr lang="en-US" sz="1900" smtClean="0">
+                <a:latin typeface="Times New Roman" panose="02020603050405020304" pitchFamily="18" charset="0"/>
+                <a:cs typeface="Times New Roman" panose="02020603050405020304" pitchFamily="18" charset="0"/>
+              </a:rPr>
+              <a:t>Có 2 hệ thống hỏi đáp:</a:t>
+            </a:r>
+          </a:p>
+          <a:p>
+            <a:pPr lvl="1">
+              <a:lnSpc>
+                <a:spcPct val="160000"/>
+              </a:lnSpc>
+            </a:pPr>
+            <a:r>
+              <a:rPr lang="en-US" sz="1900">
+                <a:latin typeface="Times New Roman" panose="02020603050405020304" pitchFamily="18" charset="0"/>
+                <a:cs typeface="Times New Roman" panose="02020603050405020304" pitchFamily="18" charset="0"/>
+              </a:rPr>
+              <a:t>Hỏi đáp dựa trên cộng đồng (Community Question Answering System): dữ liệu được thu thập chủ yếu từ những cơ sở tri thức trên internet để xây dựng nên hệ thống.</a:t>
+            </a:r>
+            <a:endParaRPr lang="vi-VN" sz="1900">
+              <a:latin typeface="Times New Roman" panose="02020603050405020304" pitchFamily="18" charset="0"/>
+              <a:cs typeface="Times New Roman" panose="02020603050405020304" pitchFamily="18" charset="0"/>
+            </a:endParaRPr>
+          </a:p>
+          <a:p>
+            <a:pPr lvl="1">
+              <a:lnSpc>
+                <a:spcPct val="160000"/>
+              </a:lnSpc>
+            </a:pPr>
+            <a:r>
+              <a:rPr lang="en-US" sz="1900">
+                <a:latin typeface="Times New Roman" panose="02020603050405020304" pitchFamily="18" charset="0"/>
+                <a:cs typeface="Times New Roman" panose="02020603050405020304" pitchFamily="18" charset="0"/>
+              </a:rPr>
+              <a:t>Hỏi đáp dựa trên bộ sinh (Generative Question Answering System): Câu trả lời sẽ tự động được sinh ra đáp ứng nhu cầu hỏi đáp được xây dựng từ các tri thức có sẵn và sinh ra câu trả lời.</a:t>
+            </a:r>
+            <a:endParaRPr lang="vi-VN" sz="1900">
+              <a:latin typeface="Times New Roman" panose="02020603050405020304" pitchFamily="18" charset="0"/>
+              <a:cs typeface="Times New Roman" panose="02020603050405020304" pitchFamily="18" charset="0"/>
+            </a:endParaRPr>
+          </a:p>
+          <a:p>
+            <a:pPr marL="274320" lvl="1" indent="0">
+              <a:lnSpc>
+                <a:spcPct val="150000"/>
+              </a:lnSpc>
+              <a:buNone/>
+            </a:pPr>
+            <a:endParaRPr lang="en-US" sz="2000" smtClean="0">
+              <a:latin typeface="Times New Roman" panose="02020603050405020304" pitchFamily="18" charset="0"/>
+              <a:cs typeface="Times New Roman" panose="02020603050405020304" pitchFamily="18" charset="0"/>
+            </a:endParaRPr>
+          </a:p>
+          <a:p>
+            <a:pPr marL="845820" lvl="1" indent="-571500">
+              <a:buFont typeface="+mj-lt"/>
+              <a:buAutoNum type="romanUcPeriod"/>
+            </a:pPr>
+            <a:endParaRPr lang="en-US">
+              <a:latin typeface="Times New Roman" panose="02020603050405020304" pitchFamily="18" charset="0"/>
+              <a:cs typeface="Times New Roman" panose="02020603050405020304" pitchFamily="18" charset="0"/>
+            </a:endParaRPr>
+          </a:p>
+          <a:p>
+            <a:pPr marL="571500" indent="-571500">
+              <a:buFont typeface="+mj-lt"/>
+              <a:buAutoNum type="romanUcPeriod"/>
+            </a:pPr>
+            <a:endParaRPr lang="en-US" smtClean="0">
+              <a:latin typeface="Times New Roman" panose="02020603050405020304" pitchFamily="18" charset="0"/>
+              <a:cs typeface="Times New Roman" panose="02020603050405020304" pitchFamily="18" charset="0"/>
+            </a:endParaRPr>
+          </a:p>
+          <a:p>
+            <a:endParaRPr lang="vi-VN"/>
+          </a:p>
+        </p:txBody>
+      </p:sp>
+    </p:spTree>
+    <p:extLst>
+      <p:ext uri="{BB962C8B-B14F-4D97-AF65-F5344CB8AC3E}">
+        <p14:creationId xmlns:p14="http://schemas.microsoft.com/office/powerpoint/2010/main" val="3776775354"/>
+      </p:ext>
+    </p:extLst>
+  </p:cSld>
+  <p:clrMapOvr>
+    <a:masterClrMapping/>
+  </p:clrMapOvr>
+  <p:timing>
+    <p:tnLst>
+      <p:par>
+        <p:cTn id="1" dur="indefinite" restart="never" nodeType="tmRoot"/>
+      </p:par>
+    </p:tnLst>
+  </p:timing>
+</p:sld>
+</file>
+
+<file path=ppt/slides/slide4.xml><?xml version="1.0" encoding="utf-8"?>
+<p:sld xmlns:a="http://schemas.openxmlformats.org/drawingml/2006/main" xmlns:r="http://schemas.openxmlformats.org/officeDocument/2006/relationships" xmlns:p="http://schemas.openxmlformats.org/presentationml/2006/main">
+  <p:cSld>
+    <p:spTree>
+      <p:nvGrpSpPr>
+        <p:cNvPr id="1" name=""/>
+        <p:cNvGrpSpPr/>
+        <p:nvPr/>
+      </p:nvGrpSpPr>
+      <p:grpSpPr>
+        <a:xfrm>
+          <a:off x="0" y="0"/>
+          <a:ext cx="0" cy="0"/>
+          <a:chOff x="0" y="0"/>
+          <a:chExt cx="0" cy="0"/>
+        </a:xfrm>
+      </p:grpSpPr>
+      <p:sp>
+        <p:nvSpPr>
+          <p:cNvPr id="2" name="Title 1"/>
+          <p:cNvSpPr>
+            <a:spLocks noGrp="1"/>
+          </p:cNvSpPr>
+          <p:nvPr>
+            <p:ph type="title"/>
+          </p:nvPr>
+        </p:nvSpPr>
+        <p:spPr/>
+        <p:txBody>
+          <a:bodyPr/>
+          <a:lstStyle/>
+          <a:p>
+            <a:endParaRPr lang="vi-VN"/>
+          </a:p>
+        </p:txBody>
+      </p:sp>
+      <p:sp>
+        <p:nvSpPr>
+          <p:cNvPr id="3" name="Content Placeholder 2"/>
+          <p:cNvSpPr>
+            <a:spLocks noGrp="1"/>
+          </p:cNvSpPr>
+          <p:nvPr>
+            <p:ph idx="1"/>
+          </p:nvPr>
+        </p:nvSpPr>
+        <p:spPr/>
+        <p:txBody>
+          <a:bodyPr/>
+          <a:lstStyle/>
+          <a:p>
+            <a:pPr marL="0" indent="0">
+              <a:buNone/>
+            </a:pPr>
+            <a:r>
+              <a:rPr lang="en-US" sz="2400" b="1" smtClean="0">
+                <a:latin typeface="Times New Roman" panose="02020603050405020304" pitchFamily="18" charset="0"/>
+                <a:cs typeface="Times New Roman" panose="02020603050405020304" pitchFamily="18" charset="0"/>
+              </a:rPr>
+              <a:t>Ý </a:t>
+            </a:r>
+            <a:r>
+              <a:rPr lang="en-US" sz="2400" b="1">
+                <a:latin typeface="Times New Roman" panose="02020603050405020304" pitchFamily="18" charset="0"/>
+                <a:cs typeface="Times New Roman" panose="02020603050405020304" pitchFamily="18" charset="0"/>
+              </a:rPr>
+              <a:t>nghĩa hệ thống hỏi đáp và nhu cầu xã hội: </a:t>
+            </a:r>
+            <a:endParaRPr lang="vi-VN" sz="2400" b="1">
+              <a:latin typeface="Times New Roman" panose="02020603050405020304" pitchFamily="18" charset="0"/>
+              <a:cs typeface="Times New Roman" panose="02020603050405020304" pitchFamily="18" charset="0"/>
+            </a:endParaRPr>
+          </a:p>
+          <a:p>
+            <a:r>
+              <a:rPr lang="en-US" smtClean="0">
+                <a:latin typeface="Times New Roman" panose="02020603050405020304" pitchFamily="18" charset="0"/>
+                <a:cs typeface="Times New Roman" panose="02020603050405020304" pitchFamily="18" charset="0"/>
+              </a:rPr>
+              <a:t>Là nơi tập trung các giải quyết các vấn đề khó khăn hoặc thắc mắc,góp ý của các bạn sinh viên.</a:t>
+            </a:r>
+          </a:p>
+          <a:p>
+            <a:r>
+              <a:rPr lang="en-US">
+                <a:latin typeface="Times New Roman" panose="02020603050405020304" pitchFamily="18" charset="0"/>
+                <a:cs typeface="Times New Roman" panose="02020603050405020304" pitchFamily="18" charset="0"/>
+              </a:rPr>
+              <a:t> Hệ thống cho phép sinh viên đặt và trả lời các </a:t>
+            </a:r>
+            <a:r>
+              <a:rPr lang="en-US">
+                <a:latin typeface="Times New Roman" panose="02020603050405020304" pitchFamily="18" charset="0"/>
+                <a:cs typeface="Times New Roman" panose="02020603050405020304" pitchFamily="18" charset="0"/>
+              </a:rPr>
+              <a:t>câu </a:t>
+            </a:r>
+            <a:r>
+              <a:rPr lang="en-US" smtClean="0">
+                <a:latin typeface="Times New Roman" panose="02020603050405020304" pitchFamily="18" charset="0"/>
+                <a:cs typeface="Times New Roman" panose="02020603050405020304" pitchFamily="18" charset="0"/>
+              </a:rPr>
+              <a:t>hỏi và sẽ là kênh thông tin kết nối giữa nhà trường và các bạn sinh viên.</a:t>
+            </a:r>
+          </a:p>
+          <a:p>
+            <a:r>
+              <a:rPr lang="en-US" smtClean="0">
+                <a:latin typeface="Times New Roman" panose="02020603050405020304" pitchFamily="18" charset="0"/>
+                <a:cs typeface="Times New Roman" panose="02020603050405020304" pitchFamily="18" charset="0"/>
+              </a:rPr>
+              <a:t>Một địa chỉ đáng tin cậy và tập trung thông tin cho toàn thể sinh viên trường Đại Học Tôn Đức Thắng.</a:t>
+            </a:r>
+            <a:endParaRPr lang="vi-VN">
+              <a:latin typeface="Times New Roman" panose="02020603050405020304" pitchFamily="18" charset="0"/>
+              <a:cs typeface="Times New Roman" panose="02020603050405020304" pitchFamily="18" charset="0"/>
+            </a:endParaRPr>
+          </a:p>
+        </p:txBody>
+      </p:sp>
+    </p:spTree>
+    <p:extLst>
+      <p:ext uri="{BB962C8B-B14F-4D97-AF65-F5344CB8AC3E}">
+        <p14:creationId xmlns:p14="http://schemas.microsoft.com/office/powerpoint/2010/main" val="2235547894"/>
+      </p:ext>
+    </p:extLst>
+  </p:cSld>
+  <p:clrMapOvr>
+    <a:masterClrMapping/>
+  </p:clrMapOvr>
+  <p:timing>
+    <p:tnLst>
+      <p:par>
+        <p:cTn id="1" dur="indefinite" restart="never" nodeType="tmRoot"/>
+      </p:par>
+    </p:tnLst>
+  </p:timing>
+</p:sld>
+</file>
+
+<file path=ppt/slides/slide5.xml><?xml version="1.0" encoding="utf-8"?>
+<p:sld xmlns:a="http://schemas.openxmlformats.org/drawingml/2006/main" xmlns:r="http://schemas.openxmlformats.org/officeDocument/2006/relationships" xmlns:p="http://schemas.openxmlformats.org/presentationml/2006/main">
+  <p:cSld>
+    <p:spTree>
+      <p:nvGrpSpPr>
+        <p:cNvPr id="1" name=""/>
+        <p:cNvGrpSpPr/>
+        <p:nvPr/>
+      </p:nvGrpSpPr>
+      <p:grpSpPr>
+        <a:xfrm>
+          <a:off x="0" y="0"/>
+          <a:ext cx="0" cy="0"/>
+          <a:chOff x="0" y="0"/>
+          <a:chExt cx="0" cy="0"/>
+        </a:xfrm>
+      </p:grpSpPr>
+      <p:sp>
+        <p:nvSpPr>
+          <p:cNvPr id="2" name="Title 1"/>
+          <p:cNvSpPr>
+            <a:spLocks noGrp="1"/>
+          </p:cNvSpPr>
+          <p:nvPr>
+            <p:ph type="title"/>
+          </p:nvPr>
+        </p:nvSpPr>
+        <p:spPr/>
+        <p:txBody>
+          <a:bodyPr/>
+          <a:lstStyle/>
+          <a:p>
+            <a:endParaRPr lang="vi-VN"/>
+          </a:p>
+        </p:txBody>
+      </p:sp>
+      <p:sp>
+        <p:nvSpPr>
+          <p:cNvPr id="3" name="Content Placeholder 2"/>
+          <p:cNvSpPr>
+            <a:spLocks noGrp="1"/>
+          </p:cNvSpPr>
+          <p:nvPr>
+            <p:ph idx="1"/>
+          </p:nvPr>
+        </p:nvSpPr>
+        <p:spPr>
+          <a:xfrm>
+            <a:off x="415710" y="1801504"/>
+            <a:ext cx="9342439" cy="4351337"/>
+          </a:xfrm>
+        </p:spPr>
+        <p:txBody>
+          <a:bodyPr>
+            <a:normAutofit fontScale="92500" lnSpcReduction="10000"/>
+          </a:bodyPr>
+          <a:lstStyle/>
+          <a:p>
+            <a:pPr marL="548640" lvl="2" indent="0">
+              <a:buNone/>
+            </a:pPr>
+            <a:r>
+              <a:rPr lang="en-US" sz="2200" b="1" smtClean="0">
+                <a:latin typeface="Times New Roman" panose="02020603050405020304" pitchFamily="18" charset="0"/>
+                <a:cs typeface="Times New Roman" panose="02020603050405020304" pitchFamily="18" charset="0"/>
+              </a:rPr>
+              <a:t>2. Mục </a:t>
+            </a:r>
+            <a:r>
+              <a:rPr lang="en-US" sz="2200" b="1">
+                <a:latin typeface="Times New Roman" panose="02020603050405020304" pitchFamily="18" charset="0"/>
+                <a:cs typeface="Times New Roman" panose="02020603050405020304" pitchFamily="18" charset="0"/>
+              </a:rPr>
+              <a:t>đích </a:t>
+            </a:r>
+            <a:r>
+              <a:rPr lang="en-US" sz="2200" b="1">
+                <a:latin typeface="Times New Roman" panose="02020603050405020304" pitchFamily="18" charset="0"/>
+                <a:cs typeface="Times New Roman" panose="02020603050405020304" pitchFamily="18" charset="0"/>
+              </a:rPr>
+              <a:t>đề </a:t>
+            </a:r>
+            <a:r>
+              <a:rPr lang="en-US" sz="2200" b="1" smtClean="0">
+                <a:latin typeface="Times New Roman" panose="02020603050405020304" pitchFamily="18" charset="0"/>
+                <a:cs typeface="Times New Roman" panose="02020603050405020304" pitchFamily="18" charset="0"/>
+              </a:rPr>
+              <a:t>tài</a:t>
+            </a:r>
+          </a:p>
+          <a:p>
+            <a:pPr lvl="2">
+              <a:lnSpc>
+                <a:spcPct val="150000"/>
+              </a:lnSpc>
+            </a:pPr>
+            <a:r>
+              <a:rPr lang="en-US" sz="1800">
+                <a:latin typeface="Times New Roman" panose="02020603050405020304" pitchFamily="18" charset="0"/>
+                <a:cs typeface="Times New Roman" panose="02020603050405020304" pitchFamily="18" charset="0"/>
+              </a:rPr>
+              <a:t>Tạo ra diễn đàn kết nối giữa sinh viên và nhà trường, thông qua website và ứng dụng điện thoại trên nền tảng Android. Là nơi cung cấp lời, trao đổi, giải đáp các thắc mắc của các bạn sinh viên, hỗ trợ sinh viên tìm kiếm thông tin một cách nhanh chóng và chính xác nhất.</a:t>
+            </a:r>
+            <a:endParaRPr lang="vi-VN" sz="1800">
+              <a:latin typeface="Times New Roman" panose="02020603050405020304" pitchFamily="18" charset="0"/>
+              <a:cs typeface="Times New Roman" panose="02020603050405020304" pitchFamily="18" charset="0"/>
+            </a:endParaRPr>
+          </a:p>
+          <a:p>
+            <a:pPr lvl="2">
+              <a:lnSpc>
+                <a:spcPct val="150000"/>
+              </a:lnSpc>
+            </a:pPr>
+            <a:r>
+              <a:rPr lang="en-US" sz="1800">
+                <a:latin typeface="Times New Roman" panose="02020603050405020304" pitchFamily="18" charset="0"/>
+                <a:cs typeface="Times New Roman" panose="02020603050405020304" pitchFamily="18" charset="0"/>
+              </a:rPr>
+              <a:t>Nghiên cứu hệ thống Question Answering và cách hiện thực một hệ thống trả lời tự động áp dụng cho sinh viên trường Đại Học Tôn Đức Thắng nói riêng và có thể mở rộng cho toàn thể xã hội sử dụng từ cơ sở dữ liệu của diễn đàn.</a:t>
+            </a:r>
+            <a:endParaRPr lang="vi-VN" sz="1800">
+              <a:latin typeface="Times New Roman" panose="02020603050405020304" pitchFamily="18" charset="0"/>
+              <a:cs typeface="Times New Roman" panose="02020603050405020304" pitchFamily="18" charset="0"/>
+            </a:endParaRPr>
+          </a:p>
+          <a:p>
+            <a:pPr marL="548640" lvl="2" indent="0">
+              <a:buNone/>
+            </a:pPr>
+            <a:r>
+              <a:rPr lang="en-US" sz="2200" b="1" smtClean="0">
+                <a:latin typeface="Times New Roman" panose="02020603050405020304" pitchFamily="18" charset="0"/>
+                <a:cs typeface="Times New Roman" panose="02020603050405020304" pitchFamily="18" charset="0"/>
+              </a:rPr>
+              <a:t>3. Đối </a:t>
+            </a:r>
+            <a:r>
+              <a:rPr lang="en-US" sz="2200" b="1">
+                <a:latin typeface="Times New Roman" panose="02020603050405020304" pitchFamily="18" charset="0"/>
+                <a:cs typeface="Times New Roman" panose="02020603050405020304" pitchFamily="18" charset="0"/>
+              </a:rPr>
+              <a:t>tượng và phạm vi </a:t>
+            </a:r>
+            <a:r>
+              <a:rPr lang="en-US" sz="2200" b="1">
+                <a:latin typeface="Times New Roman" panose="02020603050405020304" pitchFamily="18" charset="0"/>
+                <a:cs typeface="Times New Roman" panose="02020603050405020304" pitchFamily="18" charset="0"/>
+              </a:rPr>
+              <a:t>nghiên </a:t>
+            </a:r>
+            <a:r>
+              <a:rPr lang="en-US" sz="2200" b="1" smtClean="0">
+                <a:latin typeface="Times New Roman" panose="02020603050405020304" pitchFamily="18" charset="0"/>
+                <a:cs typeface="Times New Roman" panose="02020603050405020304" pitchFamily="18" charset="0"/>
+              </a:rPr>
+              <a:t>cứu</a:t>
+            </a:r>
+          </a:p>
+          <a:p>
+            <a:pPr lvl="2">
+              <a:lnSpc>
+                <a:spcPct val="150000"/>
+              </a:lnSpc>
+            </a:pPr>
+            <a:r>
+              <a:rPr lang="en-US" sz="1800">
+                <a:latin typeface="Times New Roman" panose="02020603050405020304" pitchFamily="18" charset="0"/>
+                <a:cs typeface="Times New Roman" panose="02020603050405020304" pitchFamily="18" charset="0"/>
+              </a:rPr>
+              <a:t>Nghiên cứu xây dựng diễn đàn.</a:t>
+            </a:r>
+            <a:endParaRPr lang="vi-VN" sz="1800">
+              <a:latin typeface="Times New Roman" panose="02020603050405020304" pitchFamily="18" charset="0"/>
+              <a:cs typeface="Times New Roman" panose="02020603050405020304" pitchFamily="18" charset="0"/>
+            </a:endParaRPr>
+          </a:p>
+          <a:p>
+            <a:pPr lvl="2">
+              <a:lnSpc>
+                <a:spcPct val="150000"/>
+              </a:lnSpc>
+            </a:pPr>
+            <a:r>
+              <a:rPr lang="en-US" sz="1800">
+                <a:latin typeface="Times New Roman" panose="02020603050405020304" pitchFamily="18" charset="0"/>
+                <a:cs typeface="Times New Roman" panose="02020603050405020304" pitchFamily="18" charset="0"/>
+              </a:rPr>
+              <a:t>Nghiên cứu xây dụng ứng dụng chạy trên nền tảng android.</a:t>
+            </a:r>
+            <a:endParaRPr lang="vi-VN" sz="1800">
+              <a:latin typeface="Times New Roman" panose="02020603050405020304" pitchFamily="18" charset="0"/>
+              <a:cs typeface="Times New Roman" panose="02020603050405020304" pitchFamily="18" charset="0"/>
+            </a:endParaRPr>
+          </a:p>
+          <a:p>
+            <a:pPr lvl="2">
+              <a:lnSpc>
+                <a:spcPct val="150000"/>
+              </a:lnSpc>
+            </a:pPr>
+            <a:r>
+              <a:rPr lang="en-US" sz="1800">
+                <a:latin typeface="Times New Roman" panose="02020603050405020304" pitchFamily="18" charset="0"/>
+                <a:cs typeface="Times New Roman" panose="02020603050405020304" pitchFamily="18" charset="0"/>
+              </a:rPr>
+              <a:t>Hệ thống tìm kiếm câu hỏi tương đương.</a:t>
+            </a:r>
+            <a:endParaRPr lang="vi-VN" sz="1800">
+              <a:latin typeface="Times New Roman" panose="02020603050405020304" pitchFamily="18" charset="0"/>
+              <a:cs typeface="Times New Roman" panose="02020603050405020304" pitchFamily="18" charset="0"/>
+            </a:endParaRPr>
+          </a:p>
+          <a:p>
+            <a:endParaRPr lang="vi-VN"/>
+          </a:p>
+        </p:txBody>
+      </p:sp>
+    </p:spTree>
+    <p:extLst>
+      <p:ext uri="{BB962C8B-B14F-4D97-AF65-F5344CB8AC3E}">
+        <p14:creationId xmlns:p14="http://schemas.microsoft.com/office/powerpoint/2010/main" val="2557757998"/>
+      </p:ext>
+    </p:extLst>
+  </p:cSld>
+  <p:clrMapOvr>
+    <a:masterClrMapping/>
+  </p:clrMapOvr>
+  <p:timing>
+    <p:tnLst>
+      <p:par>
+        <p:cTn id="1" dur="indefinite" restart="never" nodeType="tmRoot"/>
+      </p:par>
+    </p:tnLst>
+  </p:timing>
+</p:sld>
+</file>
+
+<file path=ppt/slides/slide6.xml><?xml version="1.0" encoding="utf-8"?>
+<p:sld xmlns:a="http://schemas.openxmlformats.org/drawingml/2006/main" xmlns:r="http://schemas.openxmlformats.org/officeDocument/2006/relationships" xmlns:p="http://schemas.openxmlformats.org/presentationml/2006/main">
+  <p:cSld>
+    <p:spTree>
+      <p:nvGrpSpPr>
+        <p:cNvPr id="1" name=""/>
+        <p:cNvGrpSpPr/>
+        <p:nvPr/>
+      </p:nvGrpSpPr>
+      <p:grpSpPr>
+        <a:xfrm>
+          <a:off x="0" y="0"/>
+          <a:ext cx="0" cy="0"/>
+          <a:chOff x="0" y="0"/>
+          <a:chExt cx="0" cy="0"/>
+        </a:xfrm>
+      </p:grpSpPr>
+      <p:sp>
+        <p:nvSpPr>
+          <p:cNvPr id="2" name="Title 1"/>
+          <p:cNvSpPr>
+            <a:spLocks noGrp="1"/>
+          </p:cNvSpPr>
+          <p:nvPr>
+            <p:ph type="title"/>
+          </p:nvPr>
+        </p:nvSpPr>
+        <p:spPr>
+          <a:xfrm>
+            <a:off x="429358" y="679658"/>
+            <a:ext cx="9692640" cy="1325562"/>
+          </a:xfrm>
+        </p:spPr>
+        <p:txBody>
+          <a:bodyPr/>
+          <a:lstStyle/>
+          <a:p>
+            <a:r>
+              <a:rPr lang="en-US" sz="3800">
+                <a:latin typeface="Times New Roman" panose="02020603050405020304" pitchFamily="18" charset="0"/>
+                <a:cs typeface="Times New Roman" panose="02020603050405020304" pitchFamily="18" charset="0"/>
+              </a:rPr>
+              <a:t>CHƯƠNG</a:t>
+            </a:r>
+            <a:r>
+              <a:rPr lang="en-US">
+                <a:latin typeface="Times New Roman" panose="02020603050405020304" pitchFamily="18" charset="0"/>
+                <a:cs typeface="Times New Roman" panose="02020603050405020304" pitchFamily="18" charset="0"/>
+              </a:rPr>
+              <a:t> </a:t>
+            </a:r>
+            <a:r>
+              <a:rPr lang="en-US" smtClean="0">
+                <a:latin typeface="Times New Roman" panose="02020603050405020304" pitchFamily="18" charset="0"/>
+                <a:cs typeface="Times New Roman" panose="02020603050405020304" pitchFamily="18" charset="0"/>
+              </a:rPr>
+              <a:t>2: XÂY </a:t>
+            </a:r>
+            <a:r>
+              <a:rPr lang="en-US">
+                <a:latin typeface="Times New Roman" panose="02020603050405020304" pitchFamily="18" charset="0"/>
+                <a:cs typeface="Times New Roman" panose="02020603050405020304" pitchFamily="18" charset="0"/>
+              </a:rPr>
+              <a:t>DỰNG HỆ THỐNG</a:t>
+            </a:r>
+            <a:r>
+              <a:rPr lang="vi-VN"/>
+              <a:t/>
+            </a:r>
+            <a:br>
+              <a:rPr lang="vi-VN"/>
+            </a:br>
+            <a:endParaRPr lang="vi-VN"/>
+          </a:p>
+        </p:txBody>
+      </p:sp>
+      <p:sp>
+        <p:nvSpPr>
+          <p:cNvPr id="3" name="Content Placeholder 2"/>
+          <p:cNvSpPr>
+            <a:spLocks noGrp="1"/>
+          </p:cNvSpPr>
+          <p:nvPr>
+            <p:ph idx="1"/>
+          </p:nvPr>
+        </p:nvSpPr>
+        <p:spPr/>
+        <p:txBody>
+          <a:bodyPr>
+            <a:noAutofit/>
+          </a:bodyPr>
+          <a:lstStyle/>
+          <a:p>
+            <a:pPr marL="0" indent="0">
+              <a:buNone/>
+            </a:pPr>
+            <a:r>
+              <a:rPr lang="en-US" sz="2000" b="1" smtClean="0">
+                <a:latin typeface="Times New Roman" panose="02020603050405020304" pitchFamily="18" charset="0"/>
+                <a:cs typeface="Times New Roman" panose="02020603050405020304" pitchFamily="18" charset="0"/>
+              </a:rPr>
+              <a:t>1.Kiến </a:t>
+            </a:r>
+            <a:r>
+              <a:rPr lang="en-US" sz="2000" b="1">
+                <a:latin typeface="Times New Roman" panose="02020603050405020304" pitchFamily="18" charset="0"/>
+                <a:cs typeface="Times New Roman" panose="02020603050405020304" pitchFamily="18" charset="0"/>
+              </a:rPr>
+              <a:t>trúc tổng quan của hệ </a:t>
+            </a:r>
+            <a:r>
+              <a:rPr lang="en-US" sz="2000" b="1" smtClean="0">
+                <a:latin typeface="Times New Roman" panose="02020603050405020304" pitchFamily="18" charset="0"/>
+                <a:cs typeface="Times New Roman" panose="02020603050405020304" pitchFamily="18" charset="0"/>
+              </a:rPr>
+              <a:t>thống:</a:t>
+            </a:r>
+          </a:p>
+          <a:p>
+            <a:pPr marL="0" indent="0">
+              <a:buNone/>
+            </a:pPr>
+            <a:r>
+              <a:rPr lang="en-US">
+                <a:latin typeface="Times New Roman" panose="02020603050405020304" pitchFamily="18" charset="0"/>
+                <a:cs typeface="Times New Roman" panose="02020603050405020304" pitchFamily="18" charset="0"/>
+              </a:rPr>
+              <a:t>Hệ thống bao gồm 4 thành phần chính: </a:t>
+            </a:r>
+            <a:endParaRPr lang="vi-VN" b="1">
+              <a:latin typeface="Times New Roman" panose="02020603050405020304" pitchFamily="18" charset="0"/>
+              <a:cs typeface="Times New Roman" panose="02020603050405020304" pitchFamily="18" charset="0"/>
+            </a:endParaRPr>
+          </a:p>
+          <a:p>
+            <a:pPr lvl="0"/>
+            <a:r>
+              <a:rPr lang="en-US">
+                <a:latin typeface="Times New Roman" panose="02020603050405020304" pitchFamily="18" charset="0"/>
+                <a:cs typeface="Times New Roman" panose="02020603050405020304" pitchFamily="18" charset="0"/>
+              </a:rPr>
+              <a:t>Web Client hay ứng dụng trên điện thoại di động là nơi hiển thì giao diện cho người dùng tương tác.</a:t>
+            </a:r>
+            <a:endParaRPr lang="vi-VN" b="1">
+              <a:latin typeface="Times New Roman" panose="02020603050405020304" pitchFamily="18" charset="0"/>
+              <a:cs typeface="Times New Roman" panose="02020603050405020304" pitchFamily="18" charset="0"/>
+            </a:endParaRPr>
+          </a:p>
+          <a:p>
+            <a:pPr lvl="0"/>
+            <a:r>
+              <a:rPr lang="en-US">
+                <a:latin typeface="Times New Roman" panose="02020603050405020304" pitchFamily="18" charset="0"/>
+                <a:cs typeface="Times New Roman" panose="02020603050405020304" pitchFamily="18" charset="0"/>
+              </a:rPr>
+              <a:t> Rest API là nơi tiếp nhận xử lý các yêu cầu từ người dùng như đăng nhập, đặt câu hỏi, tìm kiếm câu hỏi… </a:t>
+            </a:r>
+            <a:endParaRPr lang="vi-VN" b="1">
+              <a:latin typeface="Times New Roman" panose="02020603050405020304" pitchFamily="18" charset="0"/>
+              <a:cs typeface="Times New Roman" panose="02020603050405020304" pitchFamily="18" charset="0"/>
+            </a:endParaRPr>
+          </a:p>
+          <a:p>
+            <a:pPr lvl="0"/>
+            <a:r>
+              <a:rPr lang="en-US">
+                <a:latin typeface="Times New Roman" panose="02020603050405020304" pitchFamily="18" charset="0"/>
+                <a:cs typeface="Times New Roman" panose="02020603050405020304" pitchFamily="18" charset="0"/>
+              </a:rPr>
+              <a:t>Mô đun trả lời tự động là nơi xử lý các câu hỏi, tìm ra câu hỏi tương tự và gửi về cho Rest API</a:t>
+            </a:r>
+            <a:endParaRPr lang="vi-VN" b="1">
+              <a:latin typeface="Times New Roman" panose="02020603050405020304" pitchFamily="18" charset="0"/>
+              <a:cs typeface="Times New Roman" panose="02020603050405020304" pitchFamily="18" charset="0"/>
+            </a:endParaRPr>
+          </a:p>
+          <a:p>
+            <a:pPr lvl="0"/>
+            <a:r>
+              <a:rPr lang="en-US">
+                <a:latin typeface="Times New Roman" panose="02020603050405020304" pitchFamily="18" charset="0"/>
+                <a:cs typeface="Times New Roman" panose="02020603050405020304" pitchFamily="18" charset="0"/>
+              </a:rPr>
+              <a:t> Database là nơi cung cấp dữ liệu như các câu hỏi, câu trả lời, thông tin người dùng…</a:t>
+            </a:r>
+            <a:endParaRPr lang="vi-VN" b="1">
+              <a:latin typeface="Times New Roman" panose="02020603050405020304" pitchFamily="18" charset="0"/>
+              <a:cs typeface="Times New Roman" panose="02020603050405020304" pitchFamily="18" charset="0"/>
+            </a:endParaRPr>
+          </a:p>
+          <a:p>
+            <a:endParaRPr lang="en-US" sz="2800" smtClean="0">
+              <a:latin typeface="Times New Roman" panose="02020603050405020304" pitchFamily="18" charset="0"/>
+              <a:cs typeface="Times New Roman" panose="02020603050405020304" pitchFamily="18" charset="0"/>
+            </a:endParaRPr>
+          </a:p>
+          <a:p>
+            <a:endParaRPr lang="en-US" sz="2800" smtClean="0">
+              <a:latin typeface="Times New Roman" panose="02020603050405020304" pitchFamily="18" charset="0"/>
+              <a:cs typeface="Times New Roman" panose="02020603050405020304" pitchFamily="18" charset="0"/>
+            </a:endParaRPr>
+          </a:p>
+        </p:txBody>
+      </p:sp>
+    </p:spTree>
+    <p:extLst>
+      <p:ext uri="{BB962C8B-B14F-4D97-AF65-F5344CB8AC3E}">
+        <p14:creationId xmlns:p14="http://schemas.microsoft.com/office/powerpoint/2010/main" val="702421245"/>
+      </p:ext>
+    </p:extLst>
+  </p:cSld>
+  <p:clrMapOvr>
+    <a:masterClrMapping/>
+  </p:clrMapOvr>
+  <p:timing>
+    <p:tnLst>
+      <p:par>
+        <p:cTn id="1" dur="indefinite" restart="never" nodeType="tmRoot"/>
+      </p:par>
+    </p:tnLst>
+  </p:timing>
+</p:sld>
+</file>
+
+<file path=ppt/slides/slide7.xml><?xml version="1.0" encoding="utf-8"?>
+<p:sld xmlns:a="http://schemas.openxmlformats.org/drawingml/2006/main" xmlns:r="http://schemas.openxmlformats.org/officeDocument/2006/relationships" xmlns:p="http://schemas.openxmlformats.org/presentationml/2006/main">
+  <p:cSld>
+    <p:spTree>
+      <p:nvGrpSpPr>
+        <p:cNvPr id="1" name=""/>
+        <p:cNvGrpSpPr/>
+        <p:nvPr/>
+      </p:nvGrpSpPr>
+      <p:grpSpPr>
+        <a:xfrm>
+          <a:off x="0" y="0"/>
+          <a:ext cx="0" cy="0"/>
+          <a:chOff x="0" y="0"/>
+          <a:chExt cx="0" cy="0"/>
+        </a:xfrm>
+      </p:grpSpPr>
+      <p:sp>
+        <p:nvSpPr>
+          <p:cNvPr id="2" name="Title 1"/>
+          <p:cNvSpPr>
+            <a:spLocks noGrp="1"/>
+          </p:cNvSpPr>
+          <p:nvPr>
+            <p:ph type="title"/>
+          </p:nvPr>
+        </p:nvSpPr>
+        <p:spPr/>
+        <p:txBody>
+          <a:bodyPr>
+            <a:normAutofit/>
+          </a:bodyPr>
+          <a:lstStyle/>
+          <a:p>
+            <a:r>
+              <a:rPr lang="en-US" sz="3800" smtClean="0">
+                <a:latin typeface="Times New Roman" panose="02020603050405020304" pitchFamily="18" charset="0"/>
+                <a:cs typeface="Times New Roman" panose="02020603050405020304" pitchFamily="18" charset="0"/>
+              </a:rPr>
+              <a:t>Kiến </a:t>
+            </a:r>
+            <a:r>
+              <a:rPr lang="en-US" sz="3800">
+                <a:latin typeface="Times New Roman" panose="02020603050405020304" pitchFamily="18" charset="0"/>
+                <a:cs typeface="Times New Roman" panose="02020603050405020304" pitchFamily="18" charset="0"/>
+              </a:rPr>
+              <a:t>T</a:t>
+            </a:r>
+            <a:r>
+              <a:rPr lang="en-US" sz="3800" smtClean="0">
+                <a:latin typeface="Times New Roman" panose="02020603050405020304" pitchFamily="18" charset="0"/>
+                <a:cs typeface="Times New Roman" panose="02020603050405020304" pitchFamily="18" charset="0"/>
+              </a:rPr>
+              <a:t>rúc </a:t>
+            </a:r>
+            <a:r>
+              <a:rPr lang="en-US" sz="3800">
+                <a:latin typeface="Times New Roman" panose="02020603050405020304" pitchFamily="18" charset="0"/>
+                <a:cs typeface="Times New Roman" panose="02020603050405020304" pitchFamily="18" charset="0"/>
+              </a:rPr>
+              <a:t>T</a:t>
+            </a:r>
+            <a:r>
+              <a:rPr lang="en-US" sz="3800" smtClean="0">
+                <a:latin typeface="Times New Roman" panose="02020603050405020304" pitchFamily="18" charset="0"/>
+                <a:cs typeface="Times New Roman" panose="02020603050405020304" pitchFamily="18" charset="0"/>
+              </a:rPr>
+              <a:t>ổng </a:t>
+            </a:r>
+            <a:r>
+              <a:rPr lang="en-US" sz="3800">
+                <a:latin typeface="Times New Roman" panose="02020603050405020304" pitchFamily="18" charset="0"/>
+                <a:cs typeface="Times New Roman" panose="02020603050405020304" pitchFamily="18" charset="0"/>
+              </a:rPr>
+              <a:t>Q</a:t>
+            </a:r>
+            <a:r>
+              <a:rPr lang="en-US" sz="3800" smtClean="0">
+                <a:latin typeface="Times New Roman" panose="02020603050405020304" pitchFamily="18" charset="0"/>
+                <a:cs typeface="Times New Roman" panose="02020603050405020304" pitchFamily="18" charset="0"/>
+              </a:rPr>
+              <a:t>uan </a:t>
+            </a:r>
+            <a:r>
+              <a:rPr lang="en-US" sz="3800">
+                <a:latin typeface="Times New Roman" panose="02020603050405020304" pitchFamily="18" charset="0"/>
+                <a:cs typeface="Times New Roman" panose="02020603050405020304" pitchFamily="18" charset="0"/>
+              </a:rPr>
+              <a:t>C</a:t>
+            </a:r>
+            <a:r>
+              <a:rPr lang="en-US" sz="3800" smtClean="0">
+                <a:latin typeface="Times New Roman" panose="02020603050405020304" pitchFamily="18" charset="0"/>
+                <a:cs typeface="Times New Roman" panose="02020603050405020304" pitchFamily="18" charset="0"/>
+              </a:rPr>
+              <a:t>ủa </a:t>
+            </a:r>
+            <a:r>
+              <a:rPr lang="en-US" sz="3800">
+                <a:latin typeface="Times New Roman" panose="02020603050405020304" pitchFamily="18" charset="0"/>
+                <a:cs typeface="Times New Roman" panose="02020603050405020304" pitchFamily="18" charset="0"/>
+              </a:rPr>
+              <a:t>H</a:t>
+            </a:r>
+            <a:r>
+              <a:rPr lang="en-US" sz="3800" smtClean="0">
+                <a:latin typeface="Times New Roman" panose="02020603050405020304" pitchFamily="18" charset="0"/>
+                <a:cs typeface="Times New Roman" panose="02020603050405020304" pitchFamily="18" charset="0"/>
+              </a:rPr>
+              <a:t>ệ </a:t>
+            </a:r>
+            <a:r>
+              <a:rPr lang="en-US" sz="3800">
+                <a:latin typeface="Times New Roman" panose="02020603050405020304" pitchFamily="18" charset="0"/>
+                <a:cs typeface="Times New Roman" panose="02020603050405020304" pitchFamily="18" charset="0"/>
+              </a:rPr>
+              <a:t>T</a:t>
+            </a:r>
+            <a:r>
+              <a:rPr lang="en-US" sz="3800" smtClean="0">
+                <a:latin typeface="Times New Roman" panose="02020603050405020304" pitchFamily="18" charset="0"/>
+                <a:cs typeface="Times New Roman" panose="02020603050405020304" pitchFamily="18" charset="0"/>
+              </a:rPr>
+              <a:t>hống</a:t>
+            </a:r>
+            <a:r>
+              <a:rPr lang="en-US" sz="3800">
+                <a:latin typeface="Times New Roman" panose="02020603050405020304" pitchFamily="18" charset="0"/>
+                <a:cs typeface="Times New Roman" panose="02020603050405020304" pitchFamily="18" charset="0"/>
+              </a:rPr>
+              <a:t/>
+            </a:r>
+            <a:br>
+              <a:rPr lang="en-US" sz="3800">
+                <a:latin typeface="Times New Roman" panose="02020603050405020304" pitchFamily="18" charset="0"/>
+                <a:cs typeface="Times New Roman" panose="02020603050405020304" pitchFamily="18" charset="0"/>
+              </a:rPr>
+            </a:br>
+            <a:endParaRPr lang="vi-VN" sz="3800"/>
+          </a:p>
+        </p:txBody>
+      </p:sp>
+      <p:pic>
+        <p:nvPicPr>
+          <p:cNvPr id="4" name="Content Placeholder 3"/>
+          <p:cNvPicPr>
+            <a:picLocks noGrp="1"/>
+          </p:cNvPicPr>
+          <p:nvPr>
+            <p:ph idx="1"/>
+          </p:nvPr>
+        </p:nvPicPr>
+        <p:blipFill>
+          <a:blip r:embed="rId2">
+            <a:extLst>
+              <a:ext uri="{28A0092B-C50C-407E-A947-70E740481C1C}">
+                <a14:useLocalDpi xmlns:a14="http://schemas.microsoft.com/office/drawing/2010/main" val="0"/>
+              </a:ext>
+            </a:extLst>
+          </a:blip>
+          <a:stretch>
+            <a:fillRect/>
+          </a:stretch>
+        </p:blipFill>
+        <p:spPr bwMode="auto">
+          <a:xfrm>
+            <a:off x="920678" y="1472958"/>
+            <a:ext cx="9692640" cy="4832308"/>
+          </a:xfrm>
+          <a:prstGeom prst="rect">
+            <a:avLst/>
+          </a:prstGeom>
+          <a:noFill/>
+          <a:ln>
+            <a:noFill/>
+          </a:ln>
+        </p:spPr>
+      </p:pic>
+    </p:spTree>
+    <p:extLst>
+      <p:ext uri="{BB962C8B-B14F-4D97-AF65-F5344CB8AC3E}">
+        <p14:creationId xmlns:p14="http://schemas.microsoft.com/office/powerpoint/2010/main" val="3714632600"/>
+      </p:ext>
+    </p:extLst>
+  </p:cSld>
+  <p:clrMapOvr>
+    <a:masterClrMapping/>
+  </p:clrMapOvr>
+  <p:timing>
+    <p:tnLst>
+      <p:par>
+        <p:cTn id="1" dur="indefinite" restart="never" nodeType="tmRoot"/>
+      </p:par>
+    </p:tnLst>
+  </p:timing>
+</p:sld>
+</file>
+
+<file path=ppt/slides/slide8.xml><?xml version="1.0" encoding="utf-8"?>
+<p:sld xmlns:a="http://schemas.openxmlformats.org/drawingml/2006/main" xmlns:r="http://schemas.openxmlformats.org/officeDocument/2006/relationships" xmlns:p="http://schemas.openxmlformats.org/presentationml/2006/main">
+  <p:cSld>
+    <p:spTree>
+      <p:nvGrpSpPr>
+        <p:cNvPr id="1" name=""/>
+        <p:cNvGrpSpPr/>
+        <p:nvPr/>
+      </p:nvGrpSpPr>
+      <p:grpSpPr>
+        <a:xfrm>
+          <a:off x="0" y="0"/>
+          <a:ext cx="0" cy="0"/>
+          <a:chOff x="0" y="0"/>
+          <a:chExt cx="0" cy="0"/>
+        </a:xfrm>
+      </p:grpSpPr>
+      <p:sp>
+        <p:nvSpPr>
+          <p:cNvPr id="2" name="Title 1"/>
+          <p:cNvSpPr>
+            <a:spLocks noGrp="1"/>
+          </p:cNvSpPr>
+          <p:nvPr>
+            <p:ph type="title"/>
+          </p:nvPr>
+        </p:nvSpPr>
+        <p:spPr/>
+        <p:txBody>
+          <a:bodyPr>
+            <a:normAutofit/>
+          </a:bodyPr>
+          <a:lstStyle/>
+          <a:p>
+            <a:r>
+              <a:rPr lang="en-US" sz="3800" smtClean="0"/>
+              <a:t>Cơ Sở Dữ Liệu Hệ Thống</a:t>
+            </a:r>
+            <a:endParaRPr lang="vi-VN" sz="3800"/>
+          </a:p>
+        </p:txBody>
+      </p:sp>
+      <p:pic>
+        <p:nvPicPr>
+          <p:cNvPr id="4" name="Content Placeholder 3"/>
+          <p:cNvPicPr>
+            <a:picLocks noGrp="1" noChangeAspect="1"/>
+          </p:cNvPicPr>
+          <p:nvPr>
+            <p:ph idx="1"/>
+          </p:nvPr>
+        </p:nvPicPr>
+        <p:blipFill>
+          <a:blip r:embed="rId2">
+            <a:extLst>
+              <a:ext uri="{28A0092B-C50C-407E-A947-70E740481C1C}">
+                <a14:useLocalDpi xmlns:a14="http://schemas.microsoft.com/office/drawing/2010/main" val="0"/>
+              </a:ext>
+            </a:extLst>
+          </a:blip>
+          <a:stretch>
+            <a:fillRect/>
+          </a:stretch>
+        </p:blipFill>
+        <p:spPr>
+          <a:xfrm>
+            <a:off x="1934677" y="2402006"/>
+            <a:ext cx="7332153" cy="4351338"/>
+          </a:xfrm>
+        </p:spPr>
+      </p:pic>
+    </p:spTree>
+    <p:extLst>
+      <p:ext uri="{BB962C8B-B14F-4D97-AF65-F5344CB8AC3E}">
+        <p14:creationId xmlns:p14="http://schemas.microsoft.com/office/powerpoint/2010/main" val="3291630536"/>
+      </p:ext>
+    </p:extLst>
+  </p:cSld>
+  <p:clrMapOvr>
+    <a:masterClrMapping/>
+  </p:clrMapOvr>
+  <p:timing>
+    <p:tnLst>
+      <p:par>
+        <p:cTn id="1" dur="indefinite" restart="never" nodeType="tmRoot"/>
+      </p:par>
+    </p:tnLst>
+  </p:timing>
+</p:sld>
+</file>
+
 <file path=ppt/slides/slide9.xml><?xml version="1.0" encoding="utf-8"?>
 <p:sld xmlns:a="http://schemas.openxmlformats.org/drawingml/2006/main" xmlns:r="http://schemas.openxmlformats.org/officeDocument/2006/relationships" xmlns:p="http://schemas.openxmlformats.org/presentationml/2006/main">
   <p:cSld>
@@ -4649,25 +5613,41 @@
         </p:nvSpPr>
         <p:spPr/>
         <p:txBody>
-          <a:bodyPr/>
-          <a:lstStyle/>
-          <a:p>
-            <a:r>
-              <a:rPr lang="en-US" b="1">
-                <a:latin typeface="Times New Roman" panose="02020603050405020304" pitchFamily="18" charset="0"/>
-                <a:cs typeface="Times New Roman" panose="02020603050405020304" pitchFamily="18" charset="0"/>
-              </a:rPr>
-              <a:t>CHƯƠNG 5– TỔNG KẾT</a:t>
-            </a:r>
-            <a:r>
-              <a:rPr lang="vi-VN" b="1">
+          <a:bodyPr>
+            <a:normAutofit fontScale="90000"/>
+          </a:bodyPr>
+          <a:lstStyle/>
+          <a:p>
+            <a:r>
+              <a:rPr lang="en-US">
+                <a:latin typeface="Times New Roman" panose="02020603050405020304" pitchFamily="18" charset="0"/>
+                <a:cs typeface="Times New Roman" panose="02020603050405020304" pitchFamily="18" charset="0"/>
+              </a:rPr>
+              <a:t>CHƯƠNG 3 – </a:t>
+            </a:r>
+            <a:r>
+              <a:rPr lang="en-US" smtClean="0">
+                <a:latin typeface="Times New Roman" panose="02020603050405020304" pitchFamily="18" charset="0"/>
+                <a:cs typeface="Times New Roman" panose="02020603050405020304" pitchFamily="18" charset="0"/>
+              </a:rPr>
+              <a:t>XÂY </a:t>
+            </a:r>
+            <a:r>
+              <a:rPr lang="en-US">
+                <a:latin typeface="Times New Roman" panose="02020603050405020304" pitchFamily="18" charset="0"/>
+                <a:cs typeface="Times New Roman" panose="02020603050405020304" pitchFamily="18" charset="0"/>
+              </a:rPr>
+              <a:t>DỰNG CƠ CHẾ TRẢ LỜI TỰ ĐỘNG</a:t>
+            </a:r>
+            <a:r>
+              <a:rPr lang="vi-VN">
                 <a:latin typeface="Times New Roman" panose="02020603050405020304" pitchFamily="18" charset="0"/>
                 <a:cs typeface="Times New Roman" panose="02020603050405020304" pitchFamily="18" charset="0"/>
               </a:rPr>
               <a:t/>
             </a:r>
             <a:br>
-              <a:rPr lang="vi-VN" b="1">
+              <a:rPr lang="vi-VN">
                 <a:latin typeface="Times New Roman" panose="02020603050405020304" pitchFamily="18" charset="0"/>
                 <a:cs typeface="Times New Roman" panose="02020603050405020304" pitchFamily="18" charset="0"/>
               </a:rPr>
@@ -4691,7 +5671,9 @@
         </p:nvSpPr>
         <p:spPr/>
         <p:txBody>
-          <a:bodyPr/>
+          <a:bodyPr>
+            <a:normAutofit/>
+          </a:bodyPr>
           <a:lstStyle/>
           <a:p>
             <a:r>
@@ -4699,55 +5681,98 @@
                 <a:latin typeface="Times New Roman" panose="02020603050405020304" pitchFamily="18" charset="0"/>
                 <a:cs typeface="Times New Roman" panose="02020603050405020304" pitchFamily="18" charset="0"/>
               </a:rPr>
-              <a:t>Các vấn đề đã làm được:</a:t>
+              <a:t>Kiến trúc tổng </a:t>
+            </a:r>
+            <a:r>
+              <a:rPr lang="en-US" sz="2800" smtClean="0">
+                <a:latin typeface="Times New Roman" panose="02020603050405020304" pitchFamily="18" charset="0"/>
+                <a:cs typeface="Times New Roman" panose="02020603050405020304" pitchFamily="18" charset="0"/>
+              </a:rPr>
+              <a:t>quan</a:t>
+            </a:r>
+            <a:r>
+              <a:rPr lang="vi-VN" sz="2800" smtClean="0">
+                <a:latin typeface="Times New Roman" panose="02020603050405020304" pitchFamily="18" charset="0"/>
+                <a:cs typeface="Times New Roman" panose="02020603050405020304" pitchFamily="18" charset="0"/>
+              </a:rPr>
+              <a:t> hệ thống trả lời tự động</a:t>
+            </a:r>
+          </a:p>
+          <a:p>
+            <a:r>
+              <a:rPr lang="en-US" sz="2800" smtClean="0">
+                <a:latin typeface="Times New Roman" panose="02020603050405020304" pitchFamily="18" charset="0"/>
+                <a:cs typeface="Times New Roman" panose="02020603050405020304" pitchFamily="18" charset="0"/>
+              </a:rPr>
+              <a:t>Lọc </a:t>
+            </a:r>
+            <a:r>
+              <a:rPr lang="en-US" sz="2800">
+                <a:latin typeface="Times New Roman" panose="02020603050405020304" pitchFamily="18" charset="0"/>
+                <a:cs typeface="Times New Roman" panose="02020603050405020304" pitchFamily="18" charset="0"/>
+              </a:rPr>
+              <a:t>dữ liệu sử dụng Full Text </a:t>
+            </a:r>
+            <a:r>
+              <a:rPr lang="en-US" sz="2800" smtClean="0">
+                <a:latin typeface="Times New Roman" panose="02020603050405020304" pitchFamily="18" charset="0"/>
+                <a:cs typeface="Times New Roman" panose="02020603050405020304" pitchFamily="18" charset="0"/>
+              </a:rPr>
+              <a:t>Search</a:t>
+            </a:r>
+          </a:p>
+          <a:p>
+            <a:r>
+              <a:rPr lang="en-US" sz="2800">
+                <a:latin typeface="Times New Roman" panose="02020603050405020304" pitchFamily="18" charset="0"/>
+                <a:cs typeface="Times New Roman" panose="02020603050405020304" pitchFamily="18" charset="0"/>
+              </a:rPr>
+              <a:t>Tách từ</a:t>
+            </a:r>
+            <a:endParaRPr lang="en-US" sz="2800" smtClean="0">
+              <a:latin typeface="Times New Roman" panose="02020603050405020304" pitchFamily="18" charset="0"/>
+              <a:cs typeface="Times New Roman" panose="02020603050405020304" pitchFamily="18" charset="0"/>
+            </a:endParaRPr>
+          </a:p>
+          <a:p>
+            <a:r>
+              <a:rPr lang="en-US" sz="2800">
+                <a:latin typeface="Times New Roman" panose="02020603050405020304" pitchFamily="18" charset="0"/>
+                <a:cs typeface="Times New Roman" panose="02020603050405020304" pitchFamily="18" charset="0"/>
+              </a:rPr>
+              <a:t>Phân loại câu hỏi sử dụng Maximum entropy classifier</a:t>
+            </a:r>
+            <a:endParaRPr lang="en-US" sz="2800" smtClean="0">
+              <a:latin typeface="Times New Roman" panose="02020603050405020304" pitchFamily="18" charset="0"/>
+              <a:cs typeface="Times New Roman" panose="02020603050405020304" pitchFamily="18" charset="0"/>
+            </a:endParaRPr>
+          </a:p>
+          <a:p>
+            <a:r>
+              <a:rPr lang="fr-FR" sz="2800">
+                <a:latin typeface="Times New Roman" panose="02020603050405020304" pitchFamily="18" charset="0"/>
+                <a:cs typeface="Times New Roman" panose="02020603050405020304" pitchFamily="18" charset="0"/>
+              </a:rPr>
+              <a:t>Đo độ tương tự giữa các câu </a:t>
+            </a:r>
+            <a:r>
+              <a:rPr lang="fr-FR" sz="2800" smtClean="0">
+                <a:latin typeface="Times New Roman" panose="02020603050405020304" pitchFamily="18" charset="0"/>
+                <a:cs typeface="Times New Roman" panose="02020603050405020304" pitchFamily="18" charset="0"/>
+              </a:rPr>
+              <a:t>hỏi</a:t>
             </a:r>
             <a:endParaRPr lang="vi-VN" sz="2800">
               <a:latin typeface="Times New Roman" panose="02020603050405020304" pitchFamily="18" charset="0"/>
               <a:cs typeface="Times New Roman" panose="02020603050405020304" pitchFamily="18" charset="0"/>
             </a:endParaRPr>
           </a:p>
-          <a:p>
-            <a:r>
-              <a:rPr lang="en-US" sz="2800">
-                <a:latin typeface="Times New Roman" panose="02020603050405020304" pitchFamily="18" charset="0"/>
-                <a:cs typeface="Times New Roman" panose="02020603050405020304" pitchFamily="18" charset="0"/>
-              </a:rPr>
-              <a:t>Các vấn đề chưa làm được:</a:t>
-            </a:r>
-            <a:endParaRPr lang="vi-VN" sz="2800">
-              <a:latin typeface="Times New Roman" panose="02020603050405020304" pitchFamily="18" charset="0"/>
-              <a:cs typeface="Times New Roman" panose="02020603050405020304" pitchFamily="18" charset="0"/>
-            </a:endParaRPr>
-          </a:p>
-          <a:p>
-            <a:r>
-              <a:rPr lang="en-US" sz="2800">
-                <a:latin typeface="Times New Roman" panose="02020603050405020304" pitchFamily="18" charset="0"/>
-                <a:cs typeface="Times New Roman" panose="02020603050405020304" pitchFamily="18" charset="0"/>
-              </a:rPr>
-              <a:t>Hướng phát triển cho tương </a:t>
-            </a:r>
-            <a:r>
-              <a:rPr lang="en-US" sz="2800" smtClean="0">
-                <a:latin typeface="Times New Roman" panose="02020603050405020304" pitchFamily="18" charset="0"/>
-                <a:cs typeface="Times New Roman" panose="02020603050405020304" pitchFamily="18" charset="0"/>
-              </a:rPr>
-              <a:t>lai</a:t>
-            </a:r>
-            <a:endParaRPr lang="vi-VN" sz="2800">
-              <a:latin typeface="Times New Roman" panose="02020603050405020304" pitchFamily="18" charset="0"/>
-              <a:cs typeface="Times New Roman" panose="02020603050405020304" pitchFamily="18" charset="0"/>
-            </a:endParaRPr>
-          </a:p>
-          <a:p>
-            <a:endParaRPr lang="vi-VN"/>
-          </a:p>
         </p:txBody>
       </p:sp>
     </p:spTree>
     <p:extLst>
       <p:ext uri="{BB962C8B-B14F-4D97-AF65-F5344CB8AC3E}">
-        <p14:creationId xmlns:p14="http://schemas.microsoft.com/office/powerpoint/2010/main" val="2787953767"/>
+        <p14:creationId xmlns:p14="http://schemas.microsoft.com/office/powerpoint/2010/main" val="2702124910"/>
       </p:ext>
     </p:extLst>
   </p:cSld>

</xml_diff>